<commit_message>
fix up delete looping logic
</commit_message>
<xml_diff>
--- a/ForkPowerPointDeck/ForkPowerPointDeck/SampleInputFile.pptx
+++ b/ForkPowerPointDeck/ForkPowerPointDeck/SampleInputFile.pptx
@@ -5,14 +5,14 @@
     <p:sldMasterId id="2147483648" r:id="rId1"/>
   </p:sldMasterIdLst>
   <p:sldIdLst>
-    <p:sldId id="263" r:id="rId2"/>
-    <p:sldId id="256" r:id="rId3"/>
-    <p:sldId id="257" r:id="rId4"/>
-    <p:sldId id="258" r:id="rId5"/>
-    <p:sldId id="259" r:id="rId6"/>
-    <p:sldId id="260" r:id="rId7"/>
-    <p:sldId id="261" r:id="rId8"/>
-    <p:sldId id="262" r:id="rId9"/>
+    <p:sldId id="256" r:id="rId2"/>
+    <p:sldId id="257" r:id="rId3"/>
+    <p:sldId id="258" r:id="rId4"/>
+    <p:sldId id="259" r:id="rId5"/>
+    <p:sldId id="260" r:id="rId6"/>
+    <p:sldId id="261" r:id="rId7"/>
+    <p:sldId id="262" r:id="rId8"/>
+    <p:sldId id="263" r:id="rId9"/>
   </p:sldIdLst>
   <p:sldSz cx="12192000" cy="6858000"/>
   <p:notesSz cx="6858000" cy="9144000"/>
@@ -111,6 +111,11 @@
       </a:defRPr>
     </a:lvl9pPr>
   </p:defaultTextStyle>
+  <p:extLst>
+    <p:ext uri="{EFAFB233-063F-42B5-8137-9DF3F51BA10A}">
+      <p15:sldGuideLst xmlns:p15="http://schemas.microsoft.com/office/powerpoint/2012/main"/>
+    </p:ext>
+  </p:extLst>
 </p:presentation>
 </file>
 
@@ -261,7 +266,7 @@
           <a:p>
             <a:fld id="{12ED1E1D-55A8-4AE9-857D-DA50F874C535}" type="datetimeFigureOut">
               <a:rPr lang="en-US" smtClean="0"/>
-              <a:t>1/20/2024</a:t>
+              <a:t>1/21/2024</a:t>
             </a:fld>
             <a:endParaRPr lang="en-US"/>
           </a:p>
@@ -459,7 +464,7 @@
           <a:p>
             <a:fld id="{12ED1E1D-55A8-4AE9-857D-DA50F874C535}" type="datetimeFigureOut">
               <a:rPr lang="en-US" smtClean="0"/>
-              <a:t>1/20/2024</a:t>
+              <a:t>1/21/2024</a:t>
             </a:fld>
             <a:endParaRPr lang="en-US"/>
           </a:p>
@@ -667,7 +672,7 @@
           <a:p>
             <a:fld id="{12ED1E1D-55A8-4AE9-857D-DA50F874C535}" type="datetimeFigureOut">
               <a:rPr lang="en-US" smtClean="0"/>
-              <a:t>1/20/2024</a:t>
+              <a:t>1/21/2024</a:t>
             </a:fld>
             <a:endParaRPr lang="en-US"/>
           </a:p>
@@ -865,7 +870,7 @@
           <a:p>
             <a:fld id="{12ED1E1D-55A8-4AE9-857D-DA50F874C535}" type="datetimeFigureOut">
               <a:rPr lang="en-US" smtClean="0"/>
-              <a:t>1/20/2024</a:t>
+              <a:t>1/21/2024</a:t>
             </a:fld>
             <a:endParaRPr lang="en-US"/>
           </a:p>
@@ -1140,7 +1145,7 @@
           <a:p>
             <a:fld id="{12ED1E1D-55A8-4AE9-857D-DA50F874C535}" type="datetimeFigureOut">
               <a:rPr lang="en-US" smtClean="0"/>
-              <a:t>1/20/2024</a:t>
+              <a:t>1/21/2024</a:t>
             </a:fld>
             <a:endParaRPr lang="en-US"/>
           </a:p>
@@ -1405,7 +1410,7 @@
           <a:p>
             <a:fld id="{12ED1E1D-55A8-4AE9-857D-DA50F874C535}" type="datetimeFigureOut">
               <a:rPr lang="en-US" smtClean="0"/>
-              <a:t>1/20/2024</a:t>
+              <a:t>1/21/2024</a:t>
             </a:fld>
             <a:endParaRPr lang="en-US"/>
           </a:p>
@@ -1817,7 +1822,7 @@
           <a:p>
             <a:fld id="{12ED1E1D-55A8-4AE9-857D-DA50F874C535}" type="datetimeFigureOut">
               <a:rPr lang="en-US" smtClean="0"/>
-              <a:t>1/20/2024</a:t>
+              <a:t>1/21/2024</a:t>
             </a:fld>
             <a:endParaRPr lang="en-US"/>
           </a:p>
@@ -1958,7 +1963,7 @@
           <a:p>
             <a:fld id="{12ED1E1D-55A8-4AE9-857D-DA50F874C535}" type="datetimeFigureOut">
               <a:rPr lang="en-US" smtClean="0"/>
-              <a:t>1/20/2024</a:t>
+              <a:t>1/21/2024</a:t>
             </a:fld>
             <a:endParaRPr lang="en-US"/>
           </a:p>
@@ -2071,7 +2076,7 @@
           <a:p>
             <a:fld id="{12ED1E1D-55A8-4AE9-857D-DA50F874C535}" type="datetimeFigureOut">
               <a:rPr lang="en-US" smtClean="0"/>
-              <a:t>1/20/2024</a:t>
+              <a:t>1/21/2024</a:t>
             </a:fld>
             <a:endParaRPr lang="en-US"/>
           </a:p>
@@ -2382,7 +2387,7 @@
           <a:p>
             <a:fld id="{12ED1E1D-55A8-4AE9-857D-DA50F874C535}" type="datetimeFigureOut">
               <a:rPr lang="en-US" smtClean="0"/>
-              <a:t>1/20/2024</a:t>
+              <a:t>1/21/2024</a:t>
             </a:fld>
             <a:endParaRPr lang="en-US"/>
           </a:p>
@@ -2670,7 +2675,7 @@
           <a:p>
             <a:fld id="{12ED1E1D-55A8-4AE9-857D-DA50F874C535}" type="datetimeFigureOut">
               <a:rPr lang="en-US" smtClean="0"/>
-              <a:t>1/20/2024</a:t>
+              <a:t>1/21/2024</a:t>
             </a:fld>
             <a:endParaRPr lang="en-US"/>
           </a:p>
@@ -2911,7 +2916,7 @@
           <a:p>
             <a:fld id="{12ED1E1D-55A8-4AE9-857D-DA50F874C535}" type="datetimeFigureOut">
               <a:rPr lang="en-US" smtClean="0"/>
-              <a:t>1/20/2024</a:t>
+              <a:t>1/21/2024</a:t>
             </a:fld>
             <a:endParaRPr lang="en-US"/>
           </a:p>
@@ -3316,90 +3321,6 @@
   <p:cSld>
     <p:spTree>
       <p:nvGrpSpPr>
-        <p:cNvPr id="1" name="">
-          <a:extLst>
-            <a:ext uri="{FF2B5EF4-FFF2-40B4-BE49-F238E27FC236}">
-              <a16:creationId xmlns:a16="http://schemas.microsoft.com/office/drawing/2014/main" id="{762510F7-1BB9-5721-8FE0-D8D057DC9482}"/>
-            </a:ext>
-          </a:extLst>
-        </p:cNvPr>
-        <p:cNvGrpSpPr/>
-        <p:nvPr/>
-      </p:nvGrpSpPr>
-      <p:grpSpPr>
-        <a:xfrm>
-          <a:off x="0" y="0"/>
-          <a:ext cx="0" cy="0"/>
-          <a:chOff x="0" y="0"/>
-          <a:chExt cx="0" cy="0"/>
-        </a:xfrm>
-      </p:grpSpPr>
-      <p:sp>
-        <p:nvSpPr>
-          <p:cNvPr id="4" name="Rectangle 3">
-            <a:extLst>
-              <a:ext uri="{FF2B5EF4-FFF2-40B4-BE49-F238E27FC236}">
-                <a16:creationId xmlns:a16="http://schemas.microsoft.com/office/drawing/2014/main" id="{4E6E450F-8A20-1F3A-1FD8-FCFCB29EA5B1}"/>
-              </a:ext>
-            </a:extLst>
-          </p:cNvPr>
-          <p:cNvSpPr/>
-          <p:nvPr/>
-        </p:nvSpPr>
-        <p:spPr>
-          <a:xfrm>
-            <a:off x="5818520" y="3017520"/>
-            <a:ext cx="554959" cy="923330"/>
-          </a:xfrm>
-          <a:prstGeom prst="rect">
-            <a:avLst/>
-          </a:prstGeom>
-          <a:noFill/>
-        </p:spPr>
-        <p:txBody>
-          <a:bodyPr wrap="none" lIns="91440" tIns="45720" rIns="91440" bIns="45720">
-            <a:spAutoFit/>
-          </a:bodyPr>
-          <a:lstStyle/>
-          <a:p>
-            <a:pPr algn="ctr"/>
-            <a:r>
-              <a:rPr lang="en-US" sz="5400" b="0" cap="none" spc="0" dirty="0">
-                <a:ln w="0"/>
-                <a:solidFill>
-                  <a:schemeClr val="tx1"/>
-                </a:solidFill>
-                <a:effectLst>
-                  <a:outerShdw blurRad="38100" dist="19050" dir="2700000" algn="tl" rotWithShape="0">
-                    <a:schemeClr val="dk1">
-                      <a:alpha val="40000"/>
-                    </a:schemeClr>
-                  </a:outerShdw>
-                </a:effectLst>
-              </a:rPr>
-              <a:t>0</a:t>
-            </a:r>
-          </a:p>
-        </p:txBody>
-      </p:sp>
-    </p:spTree>
-    <p:extLst>
-      <p:ext uri="{BB962C8B-B14F-4D97-AF65-F5344CB8AC3E}">
-        <p14:creationId xmlns:p14="http://schemas.microsoft.com/office/powerpoint/2010/main" val="3127557150"/>
-      </p:ext>
-    </p:extLst>
-  </p:cSld>
-  <p:clrMapOvr>
-    <a:masterClrMapping/>
-  </p:clrMapOvr>
-</p:sld>
-</file>
-
-<file path=ppt/slides/slide2.xml><?xml version="1.0" encoding="utf-8"?>
-<p:sld xmlns:a="http://schemas.openxmlformats.org/drawingml/2006/main" xmlns:r="http://schemas.openxmlformats.org/officeDocument/2006/relationships" xmlns:p="http://schemas.openxmlformats.org/presentationml/2006/main">
-  <p:cSld>
-    <p:spTree>
-      <p:nvGrpSpPr>
         <p:cNvPr id="1" name=""/>
         <p:cNvGrpSpPr/>
         <p:nvPr/>
@@ -3473,7 +3394,7 @@
 </p:sld>
 </file>
 
-<file path=ppt/slides/slide3.xml><?xml version="1.0" encoding="utf-8"?>
+<file path=ppt/slides/slide2.xml><?xml version="1.0" encoding="utf-8"?>
 <p:sld xmlns:a="http://schemas.openxmlformats.org/drawingml/2006/main" xmlns:r="http://schemas.openxmlformats.org/officeDocument/2006/relationships" xmlns:p="http://schemas.openxmlformats.org/presentationml/2006/main">
   <p:cSld>
     <p:spTree>
@@ -3557,7 +3478,7 @@
 </p:sld>
 </file>
 
-<file path=ppt/slides/slide4.xml><?xml version="1.0" encoding="utf-8"?>
+<file path=ppt/slides/slide3.xml><?xml version="1.0" encoding="utf-8"?>
 <p:sld xmlns:a="http://schemas.openxmlformats.org/drawingml/2006/main" xmlns:r="http://schemas.openxmlformats.org/officeDocument/2006/relationships" xmlns:p="http://schemas.openxmlformats.org/presentationml/2006/main">
   <p:cSld>
     <p:spTree>
@@ -3641,7 +3562,7 @@
 </p:sld>
 </file>
 
-<file path=ppt/slides/slide5.xml><?xml version="1.0" encoding="utf-8"?>
+<file path=ppt/slides/slide4.xml><?xml version="1.0" encoding="utf-8"?>
 <p:sld xmlns:a="http://schemas.openxmlformats.org/drawingml/2006/main" xmlns:r="http://schemas.openxmlformats.org/officeDocument/2006/relationships" xmlns:p="http://schemas.openxmlformats.org/presentationml/2006/main">
   <p:cSld>
     <p:spTree>
@@ -3725,7 +3646,7 @@
 </p:sld>
 </file>
 
-<file path=ppt/slides/slide6.xml><?xml version="1.0" encoding="utf-8"?>
+<file path=ppt/slides/slide5.xml><?xml version="1.0" encoding="utf-8"?>
 <p:sld xmlns:a="http://schemas.openxmlformats.org/drawingml/2006/main" xmlns:r="http://schemas.openxmlformats.org/officeDocument/2006/relationships" xmlns:p="http://schemas.openxmlformats.org/presentationml/2006/main">
   <p:cSld>
     <p:spTree>
@@ -3809,7 +3730,7 @@
 </p:sld>
 </file>
 
-<file path=ppt/slides/slide7.xml><?xml version="1.0" encoding="utf-8"?>
+<file path=ppt/slides/slide6.xml><?xml version="1.0" encoding="utf-8"?>
 <p:sld xmlns:a="http://schemas.openxmlformats.org/drawingml/2006/main" xmlns:r="http://schemas.openxmlformats.org/officeDocument/2006/relationships" xmlns:p="http://schemas.openxmlformats.org/presentationml/2006/main">
   <p:cSld>
     <p:spTree>
@@ -3893,7 +3814,7 @@
 </p:sld>
 </file>
 
-<file path=ppt/slides/slide8.xml><?xml version="1.0" encoding="utf-8"?>
+<file path=ppt/slides/slide7.xml><?xml version="1.0" encoding="utf-8"?>
 <p:sld xmlns:a="http://schemas.openxmlformats.org/drawingml/2006/main" xmlns:r="http://schemas.openxmlformats.org/officeDocument/2006/relationships" xmlns:p="http://schemas.openxmlformats.org/presentationml/2006/main">
   <p:cSld>
     <p:spTree>
@@ -3968,6 +3889,90 @@
     <p:extLst>
       <p:ext uri="{BB962C8B-B14F-4D97-AF65-F5344CB8AC3E}">
         <p14:creationId xmlns:p14="http://schemas.microsoft.com/office/powerpoint/2010/main" val="562901522"/>
+      </p:ext>
+    </p:extLst>
+  </p:cSld>
+  <p:clrMapOvr>
+    <a:masterClrMapping/>
+  </p:clrMapOvr>
+</p:sld>
+</file>
+
+<file path=ppt/slides/slide8.xml><?xml version="1.0" encoding="utf-8"?>
+<p:sld xmlns:a="http://schemas.openxmlformats.org/drawingml/2006/main" xmlns:r="http://schemas.openxmlformats.org/officeDocument/2006/relationships" xmlns:p="http://schemas.openxmlformats.org/presentationml/2006/main">
+  <p:cSld>
+    <p:spTree>
+      <p:nvGrpSpPr>
+        <p:cNvPr id="1" name="">
+          <a:extLst>
+            <a:ext uri="{FF2B5EF4-FFF2-40B4-BE49-F238E27FC236}">
+              <a16:creationId xmlns:a16="http://schemas.microsoft.com/office/drawing/2014/main" id="{762510F7-1BB9-5721-8FE0-D8D057DC9482}"/>
+            </a:ext>
+          </a:extLst>
+        </p:cNvPr>
+        <p:cNvGrpSpPr/>
+        <p:nvPr/>
+      </p:nvGrpSpPr>
+      <p:grpSpPr>
+        <a:xfrm>
+          <a:off x="0" y="0"/>
+          <a:ext cx="0" cy="0"/>
+          <a:chOff x="0" y="0"/>
+          <a:chExt cx="0" cy="0"/>
+        </a:xfrm>
+      </p:grpSpPr>
+      <p:sp>
+        <p:nvSpPr>
+          <p:cNvPr id="4" name="Rectangle 3">
+            <a:extLst>
+              <a:ext uri="{FF2B5EF4-FFF2-40B4-BE49-F238E27FC236}">
+                <a16:creationId xmlns:a16="http://schemas.microsoft.com/office/drawing/2014/main" id="{4E6E450F-8A20-1F3A-1FD8-FCFCB29EA5B1}"/>
+              </a:ext>
+            </a:extLst>
+          </p:cNvPr>
+          <p:cNvSpPr/>
+          <p:nvPr/>
+        </p:nvSpPr>
+        <p:spPr>
+          <a:xfrm>
+            <a:off x="5818520" y="3017520"/>
+            <a:ext cx="554959" cy="923330"/>
+          </a:xfrm>
+          <a:prstGeom prst="rect">
+            <a:avLst/>
+          </a:prstGeom>
+          <a:noFill/>
+        </p:spPr>
+        <p:txBody>
+          <a:bodyPr wrap="none" lIns="91440" tIns="45720" rIns="91440" bIns="45720">
+            <a:spAutoFit/>
+          </a:bodyPr>
+          <a:lstStyle/>
+          <a:p>
+            <a:pPr algn="ctr"/>
+            <a:r>
+              <a:rPr lang="en-US" sz="5400" b="0" cap="none" spc="0" dirty="0">
+                <a:ln w="0"/>
+                <a:solidFill>
+                  <a:schemeClr val="tx1"/>
+                </a:solidFill>
+                <a:effectLst>
+                  <a:outerShdw blurRad="38100" dist="19050" dir="2700000" algn="tl" rotWithShape="0">
+                    <a:schemeClr val="dk1">
+                      <a:alpha val="40000"/>
+                    </a:schemeClr>
+                  </a:outerShdw>
+                </a:effectLst>
+              </a:rPr>
+              <a:t>8</a:t>
+            </a:r>
+          </a:p>
+        </p:txBody>
+      </p:sp>
+    </p:spTree>
+    <p:extLst>
+      <p:ext uri="{BB962C8B-B14F-4D97-AF65-F5344CB8AC3E}">
+        <p14:creationId xmlns:p14="http://schemas.microsoft.com/office/powerpoint/2010/main" val="3127557150"/>
       </p:ext>
     </p:extLst>
   </p:cSld>

</xml_diff>

<commit_message>
Revised based on Notes field instead of mapping file to improve management
</commit_message>
<xml_diff>
--- a/ForkPowerPointDeck/ForkPowerPointDeck/SampleInputFile.pptx
+++ b/ForkPowerPointDeck/ForkPowerPointDeck/SampleInputFile.pptx
@@ -4,6 +4,9 @@
   <p:sldMasterIdLst>
     <p:sldMasterId id="2147483648" r:id="rId1"/>
   </p:sldMasterIdLst>
+  <p:notesMasterIdLst>
+    <p:notesMasterId r:id="rId10"/>
+  </p:notesMasterIdLst>
   <p:sldIdLst>
     <p:sldId id="256" r:id="rId2"/>
     <p:sldId id="257" r:id="rId3"/>
@@ -119,6 +122,1103 @@
 </p:presentation>
 </file>
 
+<file path=ppt/notesMasters/notesMaster1.xml><?xml version="1.0" encoding="utf-8"?>
+<p:notesMaster xmlns:a="http://schemas.openxmlformats.org/drawingml/2006/main" xmlns:r="http://schemas.openxmlformats.org/officeDocument/2006/relationships" xmlns:p="http://schemas.openxmlformats.org/presentationml/2006/main">
+  <p:cSld>
+    <p:bg>
+      <p:bgRef idx="1001">
+        <a:schemeClr val="bg1"/>
+      </p:bgRef>
+    </p:bg>
+    <p:spTree>
+      <p:nvGrpSpPr>
+        <p:cNvPr id="1" name=""/>
+        <p:cNvGrpSpPr/>
+        <p:nvPr/>
+      </p:nvGrpSpPr>
+      <p:grpSpPr>
+        <a:xfrm>
+          <a:off x="0" y="0"/>
+          <a:ext cx="0" cy="0"/>
+          <a:chOff x="0" y="0"/>
+          <a:chExt cx="0" cy="0"/>
+        </a:xfrm>
+      </p:grpSpPr>
+      <p:sp>
+        <p:nvSpPr>
+          <p:cNvPr id="2" name="Header Placeholder 1"/>
+          <p:cNvSpPr>
+            <a:spLocks noGrp="1"/>
+          </p:cNvSpPr>
+          <p:nvPr>
+            <p:ph type="hdr" sz="quarter"/>
+          </p:nvPr>
+        </p:nvSpPr>
+        <p:spPr>
+          <a:xfrm>
+            <a:off x="0" y="0"/>
+            <a:ext cx="2971800" cy="458788"/>
+          </a:xfrm>
+          <a:prstGeom prst="rect">
+            <a:avLst/>
+          </a:prstGeom>
+        </p:spPr>
+        <p:txBody>
+          <a:bodyPr vert="horz" lIns="91440" tIns="45720" rIns="91440" bIns="45720" rtlCol="0"/>
+          <a:lstStyle>
+            <a:lvl1pPr algn="l">
+              <a:defRPr sz="1200"/>
+            </a:lvl1pPr>
+          </a:lstStyle>
+          <a:p>
+            <a:endParaRPr lang="en-CA"/>
+          </a:p>
+        </p:txBody>
+      </p:sp>
+      <p:sp>
+        <p:nvSpPr>
+          <p:cNvPr id="3" name="Date Placeholder 2"/>
+          <p:cNvSpPr>
+            <a:spLocks noGrp="1"/>
+          </p:cNvSpPr>
+          <p:nvPr>
+            <p:ph type="dt" idx="1"/>
+          </p:nvPr>
+        </p:nvSpPr>
+        <p:spPr>
+          <a:xfrm>
+            <a:off x="3884613" y="0"/>
+            <a:ext cx="2971800" cy="458788"/>
+          </a:xfrm>
+          <a:prstGeom prst="rect">
+            <a:avLst/>
+          </a:prstGeom>
+        </p:spPr>
+        <p:txBody>
+          <a:bodyPr vert="horz" lIns="91440" tIns="45720" rIns="91440" bIns="45720" rtlCol="0"/>
+          <a:lstStyle>
+            <a:lvl1pPr algn="r">
+              <a:defRPr sz="1200"/>
+            </a:lvl1pPr>
+          </a:lstStyle>
+          <a:p>
+            <a:fld id="{77CE5ABF-444F-4B13-947F-66DBEF03CC8B}" type="datetimeFigureOut">
+              <a:rPr lang="en-CA" smtClean="0"/>
+              <a:t>2024-01-22</a:t>
+            </a:fld>
+            <a:endParaRPr lang="en-CA"/>
+          </a:p>
+        </p:txBody>
+      </p:sp>
+      <p:sp>
+        <p:nvSpPr>
+          <p:cNvPr id="4" name="Slide Image Placeholder 3"/>
+          <p:cNvSpPr>
+            <a:spLocks noGrp="1" noRot="1" noChangeAspect="1"/>
+          </p:cNvSpPr>
+          <p:nvPr>
+            <p:ph type="sldImg" idx="2"/>
+          </p:nvPr>
+        </p:nvSpPr>
+        <p:spPr>
+          <a:xfrm>
+            <a:off x="685800" y="1143000"/>
+            <a:ext cx="5486400" cy="3086100"/>
+          </a:xfrm>
+          <a:prstGeom prst="rect">
+            <a:avLst/>
+          </a:prstGeom>
+          <a:noFill/>
+          <a:ln w="12700">
+            <a:solidFill>
+              <a:prstClr val="black"/>
+            </a:solidFill>
+          </a:ln>
+        </p:spPr>
+        <p:txBody>
+          <a:bodyPr vert="horz" lIns="91440" tIns="45720" rIns="91440" bIns="45720" rtlCol="0" anchor="ctr"/>
+          <a:lstStyle/>
+          <a:p>
+            <a:endParaRPr lang="en-CA"/>
+          </a:p>
+        </p:txBody>
+      </p:sp>
+      <p:sp>
+        <p:nvSpPr>
+          <p:cNvPr id="5" name="Notes Placeholder 4"/>
+          <p:cNvSpPr>
+            <a:spLocks noGrp="1"/>
+          </p:cNvSpPr>
+          <p:nvPr>
+            <p:ph type="body" sz="quarter" idx="3"/>
+          </p:nvPr>
+        </p:nvSpPr>
+        <p:spPr>
+          <a:xfrm>
+            <a:off x="685800" y="4400550"/>
+            <a:ext cx="5486400" cy="3600450"/>
+          </a:xfrm>
+          <a:prstGeom prst="rect">
+            <a:avLst/>
+          </a:prstGeom>
+        </p:spPr>
+        <p:txBody>
+          <a:bodyPr vert="horz" lIns="91440" tIns="45720" rIns="91440" bIns="45720" rtlCol="0"/>
+          <a:lstStyle/>
+          <a:p>
+            <a:pPr lvl="0"/>
+            <a:r>
+              <a:rPr lang="en-US"/>
+              <a:t>Click to edit Master text styles</a:t>
+            </a:r>
+          </a:p>
+          <a:p>
+            <a:pPr lvl="1"/>
+            <a:r>
+              <a:rPr lang="en-US"/>
+              <a:t>Second level</a:t>
+            </a:r>
+          </a:p>
+          <a:p>
+            <a:pPr lvl="2"/>
+            <a:r>
+              <a:rPr lang="en-US"/>
+              <a:t>Third level</a:t>
+            </a:r>
+          </a:p>
+          <a:p>
+            <a:pPr lvl="3"/>
+            <a:r>
+              <a:rPr lang="en-US"/>
+              <a:t>Fourth level</a:t>
+            </a:r>
+          </a:p>
+          <a:p>
+            <a:pPr lvl="4"/>
+            <a:r>
+              <a:rPr lang="en-US"/>
+              <a:t>Fifth level</a:t>
+            </a:r>
+            <a:endParaRPr lang="en-CA"/>
+          </a:p>
+        </p:txBody>
+      </p:sp>
+      <p:sp>
+        <p:nvSpPr>
+          <p:cNvPr id="6" name="Footer Placeholder 5"/>
+          <p:cNvSpPr>
+            <a:spLocks noGrp="1"/>
+          </p:cNvSpPr>
+          <p:nvPr>
+            <p:ph type="ftr" sz="quarter" idx="4"/>
+          </p:nvPr>
+        </p:nvSpPr>
+        <p:spPr>
+          <a:xfrm>
+            <a:off x="0" y="8685213"/>
+            <a:ext cx="2971800" cy="458787"/>
+          </a:xfrm>
+          <a:prstGeom prst="rect">
+            <a:avLst/>
+          </a:prstGeom>
+        </p:spPr>
+        <p:txBody>
+          <a:bodyPr vert="horz" lIns="91440" tIns="45720" rIns="91440" bIns="45720" rtlCol="0" anchor="b"/>
+          <a:lstStyle>
+            <a:lvl1pPr algn="l">
+              <a:defRPr sz="1200"/>
+            </a:lvl1pPr>
+          </a:lstStyle>
+          <a:p>
+            <a:endParaRPr lang="en-CA"/>
+          </a:p>
+        </p:txBody>
+      </p:sp>
+      <p:sp>
+        <p:nvSpPr>
+          <p:cNvPr id="7" name="Slide Number Placeholder 6"/>
+          <p:cNvSpPr>
+            <a:spLocks noGrp="1"/>
+          </p:cNvSpPr>
+          <p:nvPr>
+            <p:ph type="sldNum" sz="quarter" idx="5"/>
+          </p:nvPr>
+        </p:nvSpPr>
+        <p:spPr>
+          <a:xfrm>
+            <a:off x="3884613" y="8685213"/>
+            <a:ext cx="2971800" cy="458787"/>
+          </a:xfrm>
+          <a:prstGeom prst="rect">
+            <a:avLst/>
+          </a:prstGeom>
+        </p:spPr>
+        <p:txBody>
+          <a:bodyPr vert="horz" lIns="91440" tIns="45720" rIns="91440" bIns="45720" rtlCol="0" anchor="b"/>
+          <a:lstStyle>
+            <a:lvl1pPr algn="r">
+              <a:defRPr sz="1200"/>
+            </a:lvl1pPr>
+          </a:lstStyle>
+          <a:p>
+            <a:fld id="{3B16528E-AB1C-4F58-8816-0BD9831A77C3}" type="slidenum">
+              <a:rPr lang="en-CA" smtClean="0"/>
+              <a:t>‹#›</a:t>
+            </a:fld>
+            <a:endParaRPr lang="en-CA"/>
+          </a:p>
+        </p:txBody>
+      </p:sp>
+    </p:spTree>
+    <p:extLst>
+      <p:ext uri="{BB962C8B-B14F-4D97-AF65-F5344CB8AC3E}">
+        <p14:creationId xmlns:p14="http://schemas.microsoft.com/office/powerpoint/2010/main" val="2557364739"/>
+      </p:ext>
+    </p:extLst>
+  </p:cSld>
+  <p:clrMap bg1="lt1" tx1="dk1" bg2="lt2" tx2="dk2" accent1="accent1" accent2="accent2" accent3="accent3" accent4="accent4" accent5="accent5" accent6="accent6" hlink="hlink" folHlink="folHlink"/>
+  <p:notesStyle>
+    <a:lvl1pPr marL="0" algn="l" defTabSz="914400" rtl="0" eaLnBrk="1" latinLnBrk="0" hangingPunct="1">
+      <a:defRPr sz="1200" kern="1200">
+        <a:solidFill>
+          <a:schemeClr val="tx1"/>
+        </a:solidFill>
+        <a:latin typeface="+mn-lt"/>
+        <a:ea typeface="+mn-ea"/>
+        <a:cs typeface="+mn-cs"/>
+      </a:defRPr>
+    </a:lvl1pPr>
+    <a:lvl2pPr marL="457200" algn="l" defTabSz="914400" rtl="0" eaLnBrk="1" latinLnBrk="0" hangingPunct="1">
+      <a:defRPr sz="1200" kern="1200">
+        <a:solidFill>
+          <a:schemeClr val="tx1"/>
+        </a:solidFill>
+        <a:latin typeface="+mn-lt"/>
+        <a:ea typeface="+mn-ea"/>
+        <a:cs typeface="+mn-cs"/>
+      </a:defRPr>
+    </a:lvl2pPr>
+    <a:lvl3pPr marL="914400" algn="l" defTabSz="914400" rtl="0" eaLnBrk="1" latinLnBrk="0" hangingPunct="1">
+      <a:defRPr sz="1200" kern="1200">
+        <a:solidFill>
+          <a:schemeClr val="tx1"/>
+        </a:solidFill>
+        <a:latin typeface="+mn-lt"/>
+        <a:ea typeface="+mn-ea"/>
+        <a:cs typeface="+mn-cs"/>
+      </a:defRPr>
+    </a:lvl3pPr>
+    <a:lvl4pPr marL="1371600" algn="l" defTabSz="914400" rtl="0" eaLnBrk="1" latinLnBrk="0" hangingPunct="1">
+      <a:defRPr sz="1200" kern="1200">
+        <a:solidFill>
+          <a:schemeClr val="tx1"/>
+        </a:solidFill>
+        <a:latin typeface="+mn-lt"/>
+        <a:ea typeface="+mn-ea"/>
+        <a:cs typeface="+mn-cs"/>
+      </a:defRPr>
+    </a:lvl4pPr>
+    <a:lvl5pPr marL="1828800" algn="l" defTabSz="914400" rtl="0" eaLnBrk="1" latinLnBrk="0" hangingPunct="1">
+      <a:defRPr sz="1200" kern="1200">
+        <a:solidFill>
+          <a:schemeClr val="tx1"/>
+        </a:solidFill>
+        <a:latin typeface="+mn-lt"/>
+        <a:ea typeface="+mn-ea"/>
+        <a:cs typeface="+mn-cs"/>
+      </a:defRPr>
+    </a:lvl5pPr>
+    <a:lvl6pPr marL="2286000" algn="l" defTabSz="914400" rtl="0" eaLnBrk="1" latinLnBrk="0" hangingPunct="1">
+      <a:defRPr sz="1200" kern="1200">
+        <a:solidFill>
+          <a:schemeClr val="tx1"/>
+        </a:solidFill>
+        <a:latin typeface="+mn-lt"/>
+        <a:ea typeface="+mn-ea"/>
+        <a:cs typeface="+mn-cs"/>
+      </a:defRPr>
+    </a:lvl6pPr>
+    <a:lvl7pPr marL="2743200" algn="l" defTabSz="914400" rtl="0" eaLnBrk="1" latinLnBrk="0" hangingPunct="1">
+      <a:defRPr sz="1200" kern="1200">
+        <a:solidFill>
+          <a:schemeClr val="tx1"/>
+        </a:solidFill>
+        <a:latin typeface="+mn-lt"/>
+        <a:ea typeface="+mn-ea"/>
+        <a:cs typeface="+mn-cs"/>
+      </a:defRPr>
+    </a:lvl7pPr>
+    <a:lvl8pPr marL="3200400" algn="l" defTabSz="914400" rtl="0" eaLnBrk="1" latinLnBrk="0" hangingPunct="1">
+      <a:defRPr sz="1200" kern="1200">
+        <a:solidFill>
+          <a:schemeClr val="tx1"/>
+        </a:solidFill>
+        <a:latin typeface="+mn-lt"/>
+        <a:ea typeface="+mn-ea"/>
+        <a:cs typeface="+mn-cs"/>
+      </a:defRPr>
+    </a:lvl8pPr>
+    <a:lvl9pPr marL="3657600" algn="l" defTabSz="914400" rtl="0" eaLnBrk="1" latinLnBrk="0" hangingPunct="1">
+      <a:defRPr sz="1200" kern="1200">
+        <a:solidFill>
+          <a:schemeClr val="tx1"/>
+        </a:solidFill>
+        <a:latin typeface="+mn-lt"/>
+        <a:ea typeface="+mn-ea"/>
+        <a:cs typeface="+mn-cs"/>
+      </a:defRPr>
+    </a:lvl9pPr>
+  </p:notesStyle>
+</p:notesMaster>
+</file>
+
+<file path=ppt/notesSlides/notesSlide1.xml><?xml version="1.0" encoding="utf-8"?>
+<p:notes xmlns:a="http://schemas.openxmlformats.org/drawingml/2006/main" xmlns:r="http://schemas.openxmlformats.org/officeDocument/2006/relationships" xmlns:p="http://schemas.openxmlformats.org/presentationml/2006/main">
+  <p:cSld>
+    <p:spTree>
+      <p:nvGrpSpPr>
+        <p:cNvPr id="1" name=""/>
+        <p:cNvGrpSpPr/>
+        <p:nvPr/>
+      </p:nvGrpSpPr>
+      <p:grpSpPr>
+        <a:xfrm>
+          <a:off x="0" y="0"/>
+          <a:ext cx="0" cy="0"/>
+          <a:chOff x="0" y="0"/>
+          <a:chExt cx="0" cy="0"/>
+        </a:xfrm>
+      </p:grpSpPr>
+      <p:sp>
+        <p:nvSpPr>
+          <p:cNvPr id="2" name="Slide Image Placeholder 1"/>
+          <p:cNvSpPr>
+            <a:spLocks noGrp="1" noRot="1" noChangeAspect="1"/>
+          </p:cNvSpPr>
+          <p:nvPr>
+            <p:ph type="sldImg"/>
+          </p:nvPr>
+        </p:nvSpPr>
+        <p:spPr/>
+      </p:sp>
+      <p:sp>
+        <p:nvSpPr>
+          <p:cNvPr id="3" name="Notes Placeholder 2"/>
+          <p:cNvSpPr>
+            <a:spLocks noGrp="1"/>
+          </p:cNvSpPr>
+          <p:nvPr>
+            <p:ph type="body" idx="1"/>
+          </p:nvPr>
+        </p:nvSpPr>
+        <p:spPr/>
+        <p:txBody>
+          <a:bodyPr/>
+          <a:lstStyle/>
+          <a:p>
+            <a:r>
+              <a:rPr lang="en-CA" dirty="0"/>
+              <a:t>{Scenario1}</a:t>
+            </a:r>
+          </a:p>
+          <a:p>
+            <a:r>
+              <a:rPr lang="en-CA" dirty="0"/>
+              <a:t>{Scenario2}</a:t>
+            </a:r>
+          </a:p>
+        </p:txBody>
+      </p:sp>
+      <p:sp>
+        <p:nvSpPr>
+          <p:cNvPr id="4" name="Slide Number Placeholder 3"/>
+          <p:cNvSpPr>
+            <a:spLocks noGrp="1"/>
+          </p:cNvSpPr>
+          <p:nvPr>
+            <p:ph type="sldNum" sz="quarter" idx="5"/>
+          </p:nvPr>
+        </p:nvSpPr>
+        <p:spPr/>
+        <p:txBody>
+          <a:bodyPr/>
+          <a:lstStyle/>
+          <a:p>
+            <a:fld id="{3B16528E-AB1C-4F58-8816-0BD9831A77C3}" type="slidenum">
+              <a:rPr lang="en-CA" smtClean="0"/>
+              <a:t>1</a:t>
+            </a:fld>
+            <a:endParaRPr lang="en-CA"/>
+          </a:p>
+        </p:txBody>
+      </p:sp>
+    </p:spTree>
+    <p:extLst>
+      <p:ext uri="{BB962C8B-B14F-4D97-AF65-F5344CB8AC3E}">
+        <p14:creationId xmlns:p14="http://schemas.microsoft.com/office/powerpoint/2010/main" val="3802219958"/>
+      </p:ext>
+    </p:extLst>
+  </p:cSld>
+  <p:clrMapOvr>
+    <a:masterClrMapping/>
+  </p:clrMapOvr>
+</p:notes>
+</file>
+
+<file path=ppt/notesSlides/notesSlide2.xml><?xml version="1.0" encoding="utf-8"?>
+<p:notes xmlns:a="http://schemas.openxmlformats.org/drawingml/2006/main" xmlns:r="http://schemas.openxmlformats.org/officeDocument/2006/relationships" xmlns:p="http://schemas.openxmlformats.org/presentationml/2006/main">
+  <p:cSld>
+    <p:spTree>
+      <p:nvGrpSpPr>
+        <p:cNvPr id="1" name=""/>
+        <p:cNvGrpSpPr/>
+        <p:nvPr/>
+      </p:nvGrpSpPr>
+      <p:grpSpPr>
+        <a:xfrm>
+          <a:off x="0" y="0"/>
+          <a:ext cx="0" cy="0"/>
+          <a:chOff x="0" y="0"/>
+          <a:chExt cx="0" cy="0"/>
+        </a:xfrm>
+      </p:grpSpPr>
+      <p:sp>
+        <p:nvSpPr>
+          <p:cNvPr id="2" name="Slide Image Placeholder 1"/>
+          <p:cNvSpPr>
+            <a:spLocks noGrp="1" noRot="1" noChangeAspect="1"/>
+          </p:cNvSpPr>
+          <p:nvPr>
+            <p:ph type="sldImg"/>
+          </p:nvPr>
+        </p:nvSpPr>
+        <p:spPr/>
+      </p:sp>
+      <p:sp>
+        <p:nvSpPr>
+          <p:cNvPr id="3" name="Notes Placeholder 2"/>
+          <p:cNvSpPr>
+            <a:spLocks noGrp="1"/>
+          </p:cNvSpPr>
+          <p:nvPr>
+            <p:ph type="body" idx="1"/>
+          </p:nvPr>
+        </p:nvSpPr>
+        <p:spPr/>
+        <p:txBody>
+          <a:bodyPr/>
+          <a:lstStyle/>
+          <a:p>
+            <a:r>
+              <a:rPr lang="en-CA" dirty="0"/>
+              <a:t>{Scenario1}</a:t>
+            </a:r>
+          </a:p>
+          <a:p>
+            <a:r>
+              <a:rPr lang="en-CA" dirty="0"/>
+              <a:t>{Scenario2}</a:t>
+            </a:r>
+          </a:p>
+          <a:p>
+            <a:endParaRPr lang="en-CA" dirty="0"/>
+          </a:p>
+        </p:txBody>
+      </p:sp>
+      <p:sp>
+        <p:nvSpPr>
+          <p:cNvPr id="4" name="Slide Number Placeholder 3"/>
+          <p:cNvSpPr>
+            <a:spLocks noGrp="1"/>
+          </p:cNvSpPr>
+          <p:nvPr>
+            <p:ph type="sldNum" sz="quarter" idx="5"/>
+          </p:nvPr>
+        </p:nvSpPr>
+        <p:spPr/>
+        <p:txBody>
+          <a:bodyPr/>
+          <a:lstStyle/>
+          <a:p>
+            <a:fld id="{3B16528E-AB1C-4F58-8816-0BD9831A77C3}" type="slidenum">
+              <a:rPr lang="en-CA" smtClean="0"/>
+              <a:t>2</a:t>
+            </a:fld>
+            <a:endParaRPr lang="en-CA"/>
+          </a:p>
+        </p:txBody>
+      </p:sp>
+    </p:spTree>
+    <p:extLst>
+      <p:ext uri="{BB962C8B-B14F-4D97-AF65-F5344CB8AC3E}">
+        <p14:creationId xmlns:p14="http://schemas.microsoft.com/office/powerpoint/2010/main" val="453981870"/>
+      </p:ext>
+    </p:extLst>
+  </p:cSld>
+  <p:clrMapOvr>
+    <a:masterClrMapping/>
+  </p:clrMapOvr>
+</p:notes>
+</file>
+
+<file path=ppt/notesSlides/notesSlide3.xml><?xml version="1.0" encoding="utf-8"?>
+<p:notes xmlns:a="http://schemas.openxmlformats.org/drawingml/2006/main" xmlns:r="http://schemas.openxmlformats.org/officeDocument/2006/relationships" xmlns:p="http://schemas.openxmlformats.org/presentationml/2006/main">
+  <p:cSld>
+    <p:spTree>
+      <p:nvGrpSpPr>
+        <p:cNvPr id="1" name=""/>
+        <p:cNvGrpSpPr/>
+        <p:nvPr/>
+      </p:nvGrpSpPr>
+      <p:grpSpPr>
+        <a:xfrm>
+          <a:off x="0" y="0"/>
+          <a:ext cx="0" cy="0"/>
+          <a:chOff x="0" y="0"/>
+          <a:chExt cx="0" cy="0"/>
+        </a:xfrm>
+      </p:grpSpPr>
+      <p:sp>
+        <p:nvSpPr>
+          <p:cNvPr id="2" name="Slide Image Placeholder 1"/>
+          <p:cNvSpPr>
+            <a:spLocks noGrp="1" noRot="1" noChangeAspect="1"/>
+          </p:cNvSpPr>
+          <p:nvPr>
+            <p:ph type="sldImg"/>
+          </p:nvPr>
+        </p:nvSpPr>
+        <p:spPr/>
+      </p:sp>
+      <p:sp>
+        <p:nvSpPr>
+          <p:cNvPr id="3" name="Notes Placeholder 2"/>
+          <p:cNvSpPr>
+            <a:spLocks noGrp="1"/>
+          </p:cNvSpPr>
+          <p:nvPr>
+            <p:ph type="body" idx="1"/>
+          </p:nvPr>
+        </p:nvSpPr>
+        <p:spPr/>
+        <p:txBody>
+          <a:bodyPr/>
+          <a:lstStyle/>
+          <a:p>
+            <a:r>
+              <a:rPr lang="en-CA" dirty="0"/>
+              <a:t>{Scenario1}</a:t>
+            </a:r>
+          </a:p>
+          <a:p>
+            <a:r>
+              <a:rPr lang="en-CA" dirty="0"/>
+              <a:t>{Scenario2}</a:t>
+            </a:r>
+          </a:p>
+          <a:p>
+            <a:endParaRPr lang="en-CA" dirty="0"/>
+          </a:p>
+        </p:txBody>
+      </p:sp>
+      <p:sp>
+        <p:nvSpPr>
+          <p:cNvPr id="4" name="Slide Number Placeholder 3"/>
+          <p:cNvSpPr>
+            <a:spLocks noGrp="1"/>
+          </p:cNvSpPr>
+          <p:nvPr>
+            <p:ph type="sldNum" sz="quarter" idx="5"/>
+          </p:nvPr>
+        </p:nvSpPr>
+        <p:spPr/>
+        <p:txBody>
+          <a:bodyPr/>
+          <a:lstStyle/>
+          <a:p>
+            <a:fld id="{3B16528E-AB1C-4F58-8816-0BD9831A77C3}" type="slidenum">
+              <a:rPr lang="en-CA" smtClean="0"/>
+              <a:t>3</a:t>
+            </a:fld>
+            <a:endParaRPr lang="en-CA"/>
+          </a:p>
+        </p:txBody>
+      </p:sp>
+    </p:spTree>
+    <p:extLst>
+      <p:ext uri="{BB962C8B-B14F-4D97-AF65-F5344CB8AC3E}">
+        <p14:creationId xmlns:p14="http://schemas.microsoft.com/office/powerpoint/2010/main" val="4067840787"/>
+      </p:ext>
+    </p:extLst>
+  </p:cSld>
+  <p:clrMapOvr>
+    <a:masterClrMapping/>
+  </p:clrMapOvr>
+</p:notes>
+</file>
+
+<file path=ppt/notesSlides/notesSlide4.xml><?xml version="1.0" encoding="utf-8"?>
+<p:notes xmlns:a="http://schemas.openxmlformats.org/drawingml/2006/main" xmlns:r="http://schemas.openxmlformats.org/officeDocument/2006/relationships" xmlns:p="http://schemas.openxmlformats.org/presentationml/2006/main">
+  <p:cSld>
+    <p:spTree>
+      <p:nvGrpSpPr>
+        <p:cNvPr id="1" name=""/>
+        <p:cNvGrpSpPr/>
+        <p:nvPr/>
+      </p:nvGrpSpPr>
+      <p:grpSpPr>
+        <a:xfrm>
+          <a:off x="0" y="0"/>
+          <a:ext cx="0" cy="0"/>
+          <a:chOff x="0" y="0"/>
+          <a:chExt cx="0" cy="0"/>
+        </a:xfrm>
+      </p:grpSpPr>
+      <p:sp>
+        <p:nvSpPr>
+          <p:cNvPr id="2" name="Slide Image Placeholder 1"/>
+          <p:cNvSpPr>
+            <a:spLocks noGrp="1" noRot="1" noChangeAspect="1"/>
+          </p:cNvSpPr>
+          <p:nvPr>
+            <p:ph type="sldImg"/>
+          </p:nvPr>
+        </p:nvSpPr>
+        <p:spPr/>
+      </p:sp>
+      <p:sp>
+        <p:nvSpPr>
+          <p:cNvPr id="3" name="Notes Placeholder 2"/>
+          <p:cNvSpPr>
+            <a:spLocks noGrp="1"/>
+          </p:cNvSpPr>
+          <p:nvPr>
+            <p:ph type="body" idx="1"/>
+          </p:nvPr>
+        </p:nvSpPr>
+        <p:spPr/>
+        <p:txBody>
+          <a:bodyPr/>
+          <a:lstStyle/>
+          <a:p>
+            <a:r>
+              <a:rPr lang="en-CA" dirty="0"/>
+              <a:t>{Scenario1}</a:t>
+            </a:r>
+          </a:p>
+          <a:p>
+            <a:r>
+              <a:rPr lang="en-CA" dirty="0"/>
+              <a:t>{Scenario3}</a:t>
+            </a:r>
+          </a:p>
+          <a:p>
+            <a:endParaRPr lang="en-CA" dirty="0"/>
+          </a:p>
+        </p:txBody>
+      </p:sp>
+      <p:sp>
+        <p:nvSpPr>
+          <p:cNvPr id="4" name="Slide Number Placeholder 3"/>
+          <p:cNvSpPr>
+            <a:spLocks noGrp="1"/>
+          </p:cNvSpPr>
+          <p:nvPr>
+            <p:ph type="sldNum" sz="quarter" idx="5"/>
+          </p:nvPr>
+        </p:nvSpPr>
+        <p:spPr/>
+        <p:txBody>
+          <a:bodyPr/>
+          <a:lstStyle/>
+          <a:p>
+            <a:fld id="{3B16528E-AB1C-4F58-8816-0BD9831A77C3}" type="slidenum">
+              <a:rPr lang="en-CA" smtClean="0"/>
+              <a:t>4</a:t>
+            </a:fld>
+            <a:endParaRPr lang="en-CA"/>
+          </a:p>
+        </p:txBody>
+      </p:sp>
+    </p:spTree>
+    <p:extLst>
+      <p:ext uri="{BB962C8B-B14F-4D97-AF65-F5344CB8AC3E}">
+        <p14:creationId xmlns:p14="http://schemas.microsoft.com/office/powerpoint/2010/main" val="3009992057"/>
+      </p:ext>
+    </p:extLst>
+  </p:cSld>
+  <p:clrMapOvr>
+    <a:masterClrMapping/>
+  </p:clrMapOvr>
+</p:notes>
+</file>
+
+<file path=ppt/notesSlides/notesSlide5.xml><?xml version="1.0" encoding="utf-8"?>
+<p:notes xmlns:a="http://schemas.openxmlformats.org/drawingml/2006/main" xmlns:r="http://schemas.openxmlformats.org/officeDocument/2006/relationships" xmlns:p="http://schemas.openxmlformats.org/presentationml/2006/main">
+  <p:cSld>
+    <p:spTree>
+      <p:nvGrpSpPr>
+        <p:cNvPr id="1" name=""/>
+        <p:cNvGrpSpPr/>
+        <p:nvPr/>
+      </p:nvGrpSpPr>
+      <p:grpSpPr>
+        <a:xfrm>
+          <a:off x="0" y="0"/>
+          <a:ext cx="0" cy="0"/>
+          <a:chOff x="0" y="0"/>
+          <a:chExt cx="0" cy="0"/>
+        </a:xfrm>
+      </p:grpSpPr>
+      <p:sp>
+        <p:nvSpPr>
+          <p:cNvPr id="2" name="Slide Image Placeholder 1"/>
+          <p:cNvSpPr>
+            <a:spLocks noGrp="1" noRot="1" noChangeAspect="1"/>
+          </p:cNvSpPr>
+          <p:nvPr>
+            <p:ph type="sldImg"/>
+          </p:nvPr>
+        </p:nvSpPr>
+        <p:spPr/>
+      </p:sp>
+      <p:sp>
+        <p:nvSpPr>
+          <p:cNvPr id="3" name="Notes Placeholder 2"/>
+          <p:cNvSpPr>
+            <a:spLocks noGrp="1"/>
+          </p:cNvSpPr>
+          <p:nvPr>
+            <p:ph type="body" idx="1"/>
+          </p:nvPr>
+        </p:nvSpPr>
+        <p:spPr/>
+        <p:txBody>
+          <a:bodyPr/>
+          <a:lstStyle/>
+          <a:p>
+            <a:r>
+              <a:rPr lang="en-CA" dirty="0"/>
+              <a:t>{Scenario1}</a:t>
+            </a:r>
+          </a:p>
+          <a:p>
+            <a:endParaRPr lang="en-CA" dirty="0"/>
+          </a:p>
+          <a:p>
+            <a:endParaRPr lang="en-CA" dirty="0"/>
+          </a:p>
+        </p:txBody>
+      </p:sp>
+      <p:sp>
+        <p:nvSpPr>
+          <p:cNvPr id="4" name="Slide Number Placeholder 3"/>
+          <p:cNvSpPr>
+            <a:spLocks noGrp="1"/>
+          </p:cNvSpPr>
+          <p:nvPr>
+            <p:ph type="sldNum" sz="quarter" idx="5"/>
+          </p:nvPr>
+        </p:nvSpPr>
+        <p:spPr/>
+        <p:txBody>
+          <a:bodyPr/>
+          <a:lstStyle/>
+          <a:p>
+            <a:fld id="{3B16528E-AB1C-4F58-8816-0BD9831A77C3}" type="slidenum">
+              <a:rPr lang="en-CA" smtClean="0"/>
+              <a:t>5</a:t>
+            </a:fld>
+            <a:endParaRPr lang="en-CA"/>
+          </a:p>
+        </p:txBody>
+      </p:sp>
+    </p:spTree>
+    <p:extLst>
+      <p:ext uri="{BB962C8B-B14F-4D97-AF65-F5344CB8AC3E}">
+        <p14:creationId xmlns:p14="http://schemas.microsoft.com/office/powerpoint/2010/main" val="1012379495"/>
+      </p:ext>
+    </p:extLst>
+  </p:cSld>
+  <p:clrMapOvr>
+    <a:masterClrMapping/>
+  </p:clrMapOvr>
+</p:notes>
+</file>
+
+<file path=ppt/notesSlides/notesSlide6.xml><?xml version="1.0" encoding="utf-8"?>
+<p:notes xmlns:a="http://schemas.openxmlformats.org/drawingml/2006/main" xmlns:r="http://schemas.openxmlformats.org/officeDocument/2006/relationships" xmlns:p="http://schemas.openxmlformats.org/presentationml/2006/main">
+  <p:cSld>
+    <p:spTree>
+      <p:nvGrpSpPr>
+        <p:cNvPr id="1" name=""/>
+        <p:cNvGrpSpPr/>
+        <p:nvPr/>
+      </p:nvGrpSpPr>
+      <p:grpSpPr>
+        <a:xfrm>
+          <a:off x="0" y="0"/>
+          <a:ext cx="0" cy="0"/>
+          <a:chOff x="0" y="0"/>
+          <a:chExt cx="0" cy="0"/>
+        </a:xfrm>
+      </p:grpSpPr>
+      <p:sp>
+        <p:nvSpPr>
+          <p:cNvPr id="2" name="Slide Image Placeholder 1"/>
+          <p:cNvSpPr>
+            <a:spLocks noGrp="1" noRot="1" noChangeAspect="1"/>
+          </p:cNvSpPr>
+          <p:nvPr>
+            <p:ph type="sldImg"/>
+          </p:nvPr>
+        </p:nvSpPr>
+        <p:spPr/>
+      </p:sp>
+      <p:sp>
+        <p:nvSpPr>
+          <p:cNvPr id="3" name="Notes Placeholder 2"/>
+          <p:cNvSpPr>
+            <a:spLocks noGrp="1"/>
+          </p:cNvSpPr>
+          <p:nvPr>
+            <p:ph type="body" idx="1"/>
+          </p:nvPr>
+        </p:nvSpPr>
+        <p:spPr/>
+        <p:txBody>
+          <a:bodyPr/>
+          <a:lstStyle/>
+          <a:p>
+            <a:r>
+              <a:rPr lang="en-CA" dirty="0"/>
+              <a:t>{Scenario1}</a:t>
+            </a:r>
+          </a:p>
+          <a:p>
+            <a:endParaRPr lang="en-CA" dirty="0"/>
+          </a:p>
+          <a:p>
+            <a:endParaRPr lang="en-CA" dirty="0"/>
+          </a:p>
+        </p:txBody>
+      </p:sp>
+      <p:sp>
+        <p:nvSpPr>
+          <p:cNvPr id="4" name="Slide Number Placeholder 3"/>
+          <p:cNvSpPr>
+            <a:spLocks noGrp="1"/>
+          </p:cNvSpPr>
+          <p:nvPr>
+            <p:ph type="sldNum" sz="quarter" idx="5"/>
+          </p:nvPr>
+        </p:nvSpPr>
+        <p:spPr/>
+        <p:txBody>
+          <a:bodyPr/>
+          <a:lstStyle/>
+          <a:p>
+            <a:fld id="{3B16528E-AB1C-4F58-8816-0BD9831A77C3}" type="slidenum">
+              <a:rPr lang="en-CA" smtClean="0"/>
+              <a:t>6</a:t>
+            </a:fld>
+            <a:endParaRPr lang="en-CA"/>
+          </a:p>
+        </p:txBody>
+      </p:sp>
+    </p:spTree>
+    <p:extLst>
+      <p:ext uri="{BB962C8B-B14F-4D97-AF65-F5344CB8AC3E}">
+        <p14:creationId xmlns:p14="http://schemas.microsoft.com/office/powerpoint/2010/main" val="3437024378"/>
+      </p:ext>
+    </p:extLst>
+  </p:cSld>
+  <p:clrMapOvr>
+    <a:masterClrMapping/>
+  </p:clrMapOvr>
+</p:notes>
+</file>
+
+<file path=ppt/notesSlides/notesSlide7.xml><?xml version="1.0" encoding="utf-8"?>
+<p:notes xmlns:a="http://schemas.openxmlformats.org/drawingml/2006/main" xmlns:r="http://schemas.openxmlformats.org/officeDocument/2006/relationships" xmlns:p="http://schemas.openxmlformats.org/presentationml/2006/main">
+  <p:cSld>
+    <p:spTree>
+      <p:nvGrpSpPr>
+        <p:cNvPr id="1" name=""/>
+        <p:cNvGrpSpPr/>
+        <p:nvPr/>
+      </p:nvGrpSpPr>
+      <p:grpSpPr>
+        <a:xfrm>
+          <a:off x="0" y="0"/>
+          <a:ext cx="0" cy="0"/>
+          <a:chOff x="0" y="0"/>
+          <a:chExt cx="0" cy="0"/>
+        </a:xfrm>
+      </p:grpSpPr>
+      <p:sp>
+        <p:nvSpPr>
+          <p:cNvPr id="2" name="Slide Image Placeholder 1"/>
+          <p:cNvSpPr>
+            <a:spLocks noGrp="1" noRot="1" noChangeAspect="1"/>
+          </p:cNvSpPr>
+          <p:nvPr>
+            <p:ph type="sldImg"/>
+          </p:nvPr>
+        </p:nvSpPr>
+        <p:spPr/>
+      </p:sp>
+      <p:sp>
+        <p:nvSpPr>
+          <p:cNvPr id="3" name="Notes Placeholder 2"/>
+          <p:cNvSpPr>
+            <a:spLocks noGrp="1"/>
+          </p:cNvSpPr>
+          <p:nvPr>
+            <p:ph type="body" idx="1"/>
+          </p:nvPr>
+        </p:nvSpPr>
+        <p:spPr/>
+        <p:txBody>
+          <a:bodyPr/>
+          <a:lstStyle/>
+          <a:p>
+            <a:r>
+              <a:rPr lang="en-CA" dirty="0"/>
+              <a:t>{Scenario1}</a:t>
+            </a:r>
+          </a:p>
+          <a:p>
+            <a:endParaRPr lang="en-CA" dirty="0"/>
+          </a:p>
+          <a:p>
+            <a:endParaRPr lang="en-CA" dirty="0"/>
+          </a:p>
+        </p:txBody>
+      </p:sp>
+      <p:sp>
+        <p:nvSpPr>
+          <p:cNvPr id="4" name="Slide Number Placeholder 3"/>
+          <p:cNvSpPr>
+            <a:spLocks noGrp="1"/>
+          </p:cNvSpPr>
+          <p:nvPr>
+            <p:ph type="sldNum" sz="quarter" idx="5"/>
+          </p:nvPr>
+        </p:nvSpPr>
+        <p:spPr/>
+        <p:txBody>
+          <a:bodyPr/>
+          <a:lstStyle/>
+          <a:p>
+            <a:fld id="{3B16528E-AB1C-4F58-8816-0BD9831A77C3}" type="slidenum">
+              <a:rPr lang="en-CA" smtClean="0"/>
+              <a:t>7</a:t>
+            </a:fld>
+            <a:endParaRPr lang="en-CA"/>
+          </a:p>
+        </p:txBody>
+      </p:sp>
+    </p:spTree>
+    <p:extLst>
+      <p:ext uri="{BB962C8B-B14F-4D97-AF65-F5344CB8AC3E}">
+        <p14:creationId xmlns:p14="http://schemas.microsoft.com/office/powerpoint/2010/main" val="1465090776"/>
+      </p:ext>
+    </p:extLst>
+  </p:cSld>
+  <p:clrMapOvr>
+    <a:masterClrMapping/>
+  </p:clrMapOvr>
+</p:notes>
+</file>
+
+<file path=ppt/notesSlides/notesSlide8.xml><?xml version="1.0" encoding="utf-8"?>
+<p:notes xmlns:a="http://schemas.openxmlformats.org/drawingml/2006/main" xmlns:r="http://schemas.openxmlformats.org/officeDocument/2006/relationships" xmlns:p="http://schemas.openxmlformats.org/presentationml/2006/main">
+  <p:cSld>
+    <p:spTree>
+      <p:nvGrpSpPr>
+        <p:cNvPr id="1" name=""/>
+        <p:cNvGrpSpPr/>
+        <p:nvPr/>
+      </p:nvGrpSpPr>
+      <p:grpSpPr>
+        <a:xfrm>
+          <a:off x="0" y="0"/>
+          <a:ext cx="0" cy="0"/>
+          <a:chOff x="0" y="0"/>
+          <a:chExt cx="0" cy="0"/>
+        </a:xfrm>
+      </p:grpSpPr>
+      <p:sp>
+        <p:nvSpPr>
+          <p:cNvPr id="2" name="Slide Image Placeholder 1"/>
+          <p:cNvSpPr>
+            <a:spLocks noGrp="1" noRot="1" noChangeAspect="1"/>
+          </p:cNvSpPr>
+          <p:nvPr>
+            <p:ph type="sldImg"/>
+          </p:nvPr>
+        </p:nvSpPr>
+        <p:spPr/>
+      </p:sp>
+      <p:sp>
+        <p:nvSpPr>
+          <p:cNvPr id="3" name="Notes Placeholder 2"/>
+          <p:cNvSpPr>
+            <a:spLocks noGrp="1"/>
+          </p:cNvSpPr>
+          <p:nvPr>
+            <p:ph type="body" idx="1"/>
+          </p:nvPr>
+        </p:nvSpPr>
+        <p:spPr/>
+        <p:txBody>
+          <a:bodyPr/>
+          <a:lstStyle/>
+          <a:p>
+            <a:r>
+              <a:rPr lang="en-CA" dirty="0"/>
+              <a:t>{Scenario3}</a:t>
+            </a:r>
+          </a:p>
+        </p:txBody>
+      </p:sp>
+      <p:sp>
+        <p:nvSpPr>
+          <p:cNvPr id="4" name="Slide Number Placeholder 3"/>
+          <p:cNvSpPr>
+            <a:spLocks noGrp="1"/>
+          </p:cNvSpPr>
+          <p:nvPr>
+            <p:ph type="sldNum" sz="quarter" idx="5"/>
+          </p:nvPr>
+        </p:nvSpPr>
+        <p:spPr/>
+        <p:txBody>
+          <a:bodyPr/>
+          <a:lstStyle/>
+          <a:p>
+            <a:fld id="{3B16528E-AB1C-4F58-8816-0BD9831A77C3}" type="slidenum">
+              <a:rPr lang="en-CA" smtClean="0"/>
+              <a:t>8</a:t>
+            </a:fld>
+            <a:endParaRPr lang="en-CA"/>
+          </a:p>
+        </p:txBody>
+      </p:sp>
+    </p:spTree>
+    <p:extLst>
+      <p:ext uri="{BB962C8B-B14F-4D97-AF65-F5344CB8AC3E}">
+        <p14:creationId xmlns:p14="http://schemas.microsoft.com/office/powerpoint/2010/main" val="1098588987"/>
+      </p:ext>
+    </p:extLst>
+  </p:cSld>
+  <p:clrMapOvr>
+    <a:masterClrMapping/>
+  </p:clrMapOvr>
+</p:notes>
+</file>
+
 <file path=ppt/slideLayouts/slideLayout1.xml><?xml version="1.0" encoding="utf-8"?>
 <p:sldLayout xmlns:a="http://schemas.openxmlformats.org/drawingml/2006/main" xmlns:r="http://schemas.openxmlformats.org/officeDocument/2006/relationships" xmlns:p="http://schemas.openxmlformats.org/presentationml/2006/main" type="title" preserve="1">
   <p:cSld name="Title Slide">
@@ -266,7 +1366,7 @@
           <a:p>
             <a:fld id="{12ED1E1D-55A8-4AE9-857D-DA50F874C535}" type="datetimeFigureOut">
               <a:rPr lang="en-US" smtClean="0"/>
-              <a:t>1/21/2024</a:t>
+              <a:t>1/22/2024</a:t>
             </a:fld>
             <a:endParaRPr lang="en-US"/>
           </a:p>
@@ -464,7 +1564,7 @@
           <a:p>
             <a:fld id="{12ED1E1D-55A8-4AE9-857D-DA50F874C535}" type="datetimeFigureOut">
               <a:rPr lang="en-US" smtClean="0"/>
-              <a:t>1/21/2024</a:t>
+              <a:t>1/22/2024</a:t>
             </a:fld>
             <a:endParaRPr lang="en-US"/>
           </a:p>
@@ -672,7 +1772,7 @@
           <a:p>
             <a:fld id="{12ED1E1D-55A8-4AE9-857D-DA50F874C535}" type="datetimeFigureOut">
               <a:rPr lang="en-US" smtClean="0"/>
-              <a:t>1/21/2024</a:t>
+              <a:t>1/22/2024</a:t>
             </a:fld>
             <a:endParaRPr lang="en-US"/>
           </a:p>
@@ -870,7 +1970,7 @@
           <a:p>
             <a:fld id="{12ED1E1D-55A8-4AE9-857D-DA50F874C535}" type="datetimeFigureOut">
               <a:rPr lang="en-US" smtClean="0"/>
-              <a:t>1/21/2024</a:t>
+              <a:t>1/22/2024</a:t>
             </a:fld>
             <a:endParaRPr lang="en-US"/>
           </a:p>
@@ -1145,7 +2245,7 @@
           <a:p>
             <a:fld id="{12ED1E1D-55A8-4AE9-857D-DA50F874C535}" type="datetimeFigureOut">
               <a:rPr lang="en-US" smtClean="0"/>
-              <a:t>1/21/2024</a:t>
+              <a:t>1/22/2024</a:t>
             </a:fld>
             <a:endParaRPr lang="en-US"/>
           </a:p>
@@ -1410,7 +2510,7 @@
           <a:p>
             <a:fld id="{12ED1E1D-55A8-4AE9-857D-DA50F874C535}" type="datetimeFigureOut">
               <a:rPr lang="en-US" smtClean="0"/>
-              <a:t>1/21/2024</a:t>
+              <a:t>1/22/2024</a:t>
             </a:fld>
             <a:endParaRPr lang="en-US"/>
           </a:p>
@@ -1822,7 +2922,7 @@
           <a:p>
             <a:fld id="{12ED1E1D-55A8-4AE9-857D-DA50F874C535}" type="datetimeFigureOut">
               <a:rPr lang="en-US" smtClean="0"/>
-              <a:t>1/21/2024</a:t>
+              <a:t>1/22/2024</a:t>
             </a:fld>
             <a:endParaRPr lang="en-US"/>
           </a:p>
@@ -1963,7 +3063,7 @@
           <a:p>
             <a:fld id="{12ED1E1D-55A8-4AE9-857D-DA50F874C535}" type="datetimeFigureOut">
               <a:rPr lang="en-US" smtClean="0"/>
-              <a:t>1/21/2024</a:t>
+              <a:t>1/22/2024</a:t>
             </a:fld>
             <a:endParaRPr lang="en-US"/>
           </a:p>
@@ -2076,7 +3176,7 @@
           <a:p>
             <a:fld id="{12ED1E1D-55A8-4AE9-857D-DA50F874C535}" type="datetimeFigureOut">
               <a:rPr lang="en-US" smtClean="0"/>
-              <a:t>1/21/2024</a:t>
+              <a:t>1/22/2024</a:t>
             </a:fld>
             <a:endParaRPr lang="en-US"/>
           </a:p>
@@ -2387,7 +3487,7 @@
           <a:p>
             <a:fld id="{12ED1E1D-55A8-4AE9-857D-DA50F874C535}" type="datetimeFigureOut">
               <a:rPr lang="en-US" smtClean="0"/>
-              <a:t>1/21/2024</a:t>
+              <a:t>1/22/2024</a:t>
             </a:fld>
             <a:endParaRPr lang="en-US"/>
           </a:p>
@@ -2675,7 +3775,7 @@
           <a:p>
             <a:fld id="{12ED1E1D-55A8-4AE9-857D-DA50F874C535}" type="datetimeFigureOut">
               <a:rPr lang="en-US" smtClean="0"/>
-              <a:t>1/21/2024</a:t>
+              <a:t>1/22/2024</a:t>
             </a:fld>
             <a:endParaRPr lang="en-US"/>
           </a:p>
@@ -2916,7 +4016,7 @@
           <a:p>
             <a:fld id="{12ED1E1D-55A8-4AE9-857D-DA50F874C535}" type="datetimeFigureOut">
               <a:rPr lang="en-US" smtClean="0"/>
-              <a:t>1/21/2024</a:t>
+              <a:t>1/22/2024</a:t>
             </a:fld>
             <a:endParaRPr lang="en-US"/>
           </a:p>
@@ -4297,6 +5397,321 @@
 </a:theme>
 </file>
 
+<file path=ppt/theme/theme2.xml><?xml version="1.0" encoding="utf-8"?>
+<a:theme xmlns:a="http://schemas.openxmlformats.org/drawingml/2006/main" name="Office Theme">
+  <a:themeElements>
+    <a:clrScheme name="Office">
+      <a:dk1>
+        <a:sysClr val="windowText" lastClr="000000"/>
+      </a:dk1>
+      <a:lt1>
+        <a:sysClr val="window" lastClr="FFFFFF"/>
+      </a:lt1>
+      <a:dk2>
+        <a:srgbClr val="0E2841"/>
+      </a:dk2>
+      <a:lt2>
+        <a:srgbClr val="E8E8E8"/>
+      </a:lt2>
+      <a:accent1>
+        <a:srgbClr val="156082"/>
+      </a:accent1>
+      <a:accent2>
+        <a:srgbClr val="E97132"/>
+      </a:accent2>
+      <a:accent3>
+        <a:srgbClr val="196B24"/>
+      </a:accent3>
+      <a:accent4>
+        <a:srgbClr val="0F9ED5"/>
+      </a:accent4>
+      <a:accent5>
+        <a:srgbClr val="A02B93"/>
+      </a:accent5>
+      <a:accent6>
+        <a:srgbClr val="4EA72E"/>
+      </a:accent6>
+      <a:hlink>
+        <a:srgbClr val="467886"/>
+      </a:hlink>
+      <a:folHlink>
+        <a:srgbClr val="96607D"/>
+      </a:folHlink>
+    </a:clrScheme>
+    <a:fontScheme name="Office">
+      <a:majorFont>
+        <a:latin typeface="Aptos Display" panose="02110004020202020204"/>
+        <a:ea typeface=""/>
+        <a:cs typeface=""/>
+        <a:font script="Jpan" typeface="游ゴシック Light"/>
+        <a:font script="Hang" typeface="맑은 고딕"/>
+        <a:font script="Hans" typeface="等线 Light"/>
+        <a:font script="Hant" typeface="新細明體"/>
+        <a:font script="Arab" typeface="Times New Roman"/>
+        <a:font script="Hebr" typeface="Times New Roman"/>
+        <a:font script="Thai" typeface="Angsana New"/>
+        <a:font script="Ethi" typeface="Nyala"/>
+        <a:font script="Beng" typeface="Vrinda"/>
+        <a:font script="Gujr" typeface="Shruti"/>
+        <a:font script="Khmr" typeface="MoolBoran"/>
+        <a:font script="Knda" typeface="Tunga"/>
+        <a:font script="Guru" typeface="Raavi"/>
+        <a:font script="Cans" typeface="Euphemia"/>
+        <a:font script="Cher" typeface="Plantagenet Cherokee"/>
+        <a:font script="Yiii" typeface="Microsoft Yi Baiti"/>
+        <a:font script="Tibt" typeface="Microsoft Himalaya"/>
+        <a:font script="Thaa" typeface="MV Boli"/>
+        <a:font script="Deva" typeface="Mangal"/>
+        <a:font script="Telu" typeface="Gautami"/>
+        <a:font script="Taml" typeface="Latha"/>
+        <a:font script="Syrc" typeface="Estrangelo Edessa"/>
+        <a:font script="Orya" typeface="Kalinga"/>
+        <a:font script="Mlym" typeface="Kartika"/>
+        <a:font script="Laoo" typeface="DokChampa"/>
+        <a:font script="Sinh" typeface="Iskoola Pota"/>
+        <a:font script="Mong" typeface="Mongolian Baiti"/>
+        <a:font script="Viet" typeface="Times New Roman"/>
+        <a:font script="Uigh" typeface="Microsoft Uighur"/>
+        <a:font script="Geor" typeface="Sylfaen"/>
+        <a:font script="Armn" typeface="Arial"/>
+        <a:font script="Bugi" typeface="Leelawadee UI"/>
+        <a:font script="Bopo" typeface="Microsoft JhengHei"/>
+        <a:font script="Java" typeface="Javanese Text"/>
+        <a:font script="Lisu" typeface="Segoe UI"/>
+        <a:font script="Mymr" typeface="Myanmar Text"/>
+        <a:font script="Nkoo" typeface="Ebrima"/>
+        <a:font script="Olck" typeface="Nirmala UI"/>
+        <a:font script="Osma" typeface="Ebrima"/>
+        <a:font script="Phag" typeface="Phagspa"/>
+        <a:font script="Syrn" typeface="Estrangelo Edessa"/>
+        <a:font script="Syrj" typeface="Estrangelo Edessa"/>
+        <a:font script="Syre" typeface="Estrangelo Edessa"/>
+        <a:font script="Sora" typeface="Nirmala UI"/>
+        <a:font script="Tale" typeface="Microsoft Tai Le"/>
+        <a:font script="Talu" typeface="Microsoft New Tai Lue"/>
+        <a:font script="Tfng" typeface="Ebrima"/>
+      </a:majorFont>
+      <a:minorFont>
+        <a:latin typeface="Aptos" panose="02110004020202020204"/>
+        <a:ea typeface=""/>
+        <a:cs typeface=""/>
+        <a:font script="Jpan" typeface="游ゴシック"/>
+        <a:font script="Hang" typeface="맑은 고딕"/>
+        <a:font script="Hans" typeface="等线"/>
+        <a:font script="Hant" typeface="新細明體"/>
+        <a:font script="Arab" typeface="Arial"/>
+        <a:font script="Hebr" typeface="Arial"/>
+        <a:font script="Thai" typeface="Cordia New"/>
+        <a:font script="Ethi" typeface="Nyala"/>
+        <a:font script="Beng" typeface="Vrinda"/>
+        <a:font script="Gujr" typeface="Shruti"/>
+        <a:font script="Khmr" typeface="DaunPenh"/>
+        <a:font script="Knda" typeface="Tunga"/>
+        <a:font script="Guru" typeface="Raavi"/>
+        <a:font script="Cans" typeface="Euphemia"/>
+        <a:font script="Cher" typeface="Plantagenet Cherokee"/>
+        <a:font script="Yiii" typeface="Microsoft Yi Baiti"/>
+        <a:font script="Tibt" typeface="Microsoft Himalaya"/>
+        <a:font script="Thaa" typeface="MV Boli"/>
+        <a:font script="Deva" typeface="Mangal"/>
+        <a:font script="Telu" typeface="Gautami"/>
+        <a:font script="Taml" typeface="Latha"/>
+        <a:font script="Syrc" typeface="Estrangelo Edessa"/>
+        <a:font script="Orya" typeface="Kalinga"/>
+        <a:font script="Mlym" typeface="Kartika"/>
+        <a:font script="Laoo" typeface="DokChampa"/>
+        <a:font script="Sinh" typeface="Iskoola Pota"/>
+        <a:font script="Mong" typeface="Mongolian Baiti"/>
+        <a:font script="Viet" typeface="Arial"/>
+        <a:font script="Uigh" typeface="Microsoft Uighur"/>
+        <a:font script="Geor" typeface="Sylfaen"/>
+        <a:font script="Armn" typeface="Arial"/>
+        <a:font script="Bugi" typeface="Leelawadee UI"/>
+        <a:font script="Bopo" typeface="Microsoft JhengHei"/>
+        <a:font script="Java" typeface="Javanese Text"/>
+        <a:font script="Lisu" typeface="Segoe UI"/>
+        <a:font script="Mymr" typeface="Myanmar Text"/>
+        <a:font script="Nkoo" typeface="Ebrima"/>
+        <a:font script="Olck" typeface="Nirmala UI"/>
+        <a:font script="Osma" typeface="Ebrima"/>
+        <a:font script="Phag" typeface="Phagspa"/>
+        <a:font script="Syrn" typeface="Estrangelo Edessa"/>
+        <a:font script="Syrj" typeface="Estrangelo Edessa"/>
+        <a:font script="Syre" typeface="Estrangelo Edessa"/>
+        <a:font script="Sora" typeface="Nirmala UI"/>
+        <a:font script="Tale" typeface="Microsoft Tai Le"/>
+        <a:font script="Talu" typeface="Microsoft New Tai Lue"/>
+        <a:font script="Tfng" typeface="Ebrima"/>
+      </a:minorFont>
+    </a:fontScheme>
+    <a:fmtScheme name="Office">
+      <a:fillStyleLst>
+        <a:solidFill>
+          <a:schemeClr val="phClr"/>
+        </a:solidFill>
+        <a:gradFill rotWithShape="1">
+          <a:gsLst>
+            <a:gs pos="0">
+              <a:schemeClr val="phClr">
+                <a:lumMod val="110000"/>
+                <a:satMod val="105000"/>
+                <a:tint val="67000"/>
+              </a:schemeClr>
+            </a:gs>
+            <a:gs pos="50000">
+              <a:schemeClr val="phClr">
+                <a:lumMod val="105000"/>
+                <a:satMod val="103000"/>
+                <a:tint val="73000"/>
+              </a:schemeClr>
+            </a:gs>
+            <a:gs pos="100000">
+              <a:schemeClr val="phClr">
+                <a:lumMod val="105000"/>
+                <a:satMod val="109000"/>
+                <a:tint val="81000"/>
+              </a:schemeClr>
+            </a:gs>
+          </a:gsLst>
+          <a:lin ang="5400000" scaled="0"/>
+        </a:gradFill>
+        <a:gradFill rotWithShape="1">
+          <a:gsLst>
+            <a:gs pos="0">
+              <a:schemeClr val="phClr">
+                <a:satMod val="103000"/>
+                <a:lumMod val="102000"/>
+                <a:tint val="94000"/>
+              </a:schemeClr>
+            </a:gs>
+            <a:gs pos="50000">
+              <a:schemeClr val="phClr">
+                <a:satMod val="110000"/>
+                <a:lumMod val="100000"/>
+                <a:shade val="100000"/>
+              </a:schemeClr>
+            </a:gs>
+            <a:gs pos="100000">
+              <a:schemeClr val="phClr">
+                <a:lumMod val="99000"/>
+                <a:satMod val="120000"/>
+                <a:shade val="78000"/>
+              </a:schemeClr>
+            </a:gs>
+          </a:gsLst>
+          <a:lin ang="5400000" scaled="0"/>
+        </a:gradFill>
+      </a:fillStyleLst>
+      <a:lnStyleLst>
+        <a:ln w="12700" cap="flat" cmpd="sng" algn="ctr">
+          <a:solidFill>
+            <a:schemeClr val="phClr"/>
+          </a:solidFill>
+          <a:prstDash val="solid"/>
+          <a:miter lim="800000"/>
+        </a:ln>
+        <a:ln w="19050" cap="flat" cmpd="sng" algn="ctr">
+          <a:solidFill>
+            <a:schemeClr val="phClr"/>
+          </a:solidFill>
+          <a:prstDash val="solid"/>
+          <a:miter lim="800000"/>
+        </a:ln>
+        <a:ln w="25400" cap="flat" cmpd="sng" algn="ctr">
+          <a:solidFill>
+            <a:schemeClr val="phClr"/>
+          </a:solidFill>
+          <a:prstDash val="solid"/>
+          <a:miter lim="800000"/>
+        </a:ln>
+      </a:lnStyleLst>
+      <a:effectStyleLst>
+        <a:effectStyle>
+          <a:effectLst/>
+        </a:effectStyle>
+        <a:effectStyle>
+          <a:effectLst/>
+        </a:effectStyle>
+        <a:effectStyle>
+          <a:effectLst>
+            <a:outerShdw blurRad="57150" dist="19050" dir="5400000" algn="ctr" rotWithShape="0">
+              <a:srgbClr val="000000">
+                <a:alpha val="63000"/>
+              </a:srgbClr>
+            </a:outerShdw>
+          </a:effectLst>
+        </a:effectStyle>
+      </a:effectStyleLst>
+      <a:bgFillStyleLst>
+        <a:solidFill>
+          <a:schemeClr val="phClr"/>
+        </a:solidFill>
+        <a:solidFill>
+          <a:schemeClr val="phClr">
+            <a:tint val="95000"/>
+            <a:satMod val="170000"/>
+          </a:schemeClr>
+        </a:solidFill>
+        <a:gradFill rotWithShape="1">
+          <a:gsLst>
+            <a:gs pos="0">
+              <a:schemeClr val="phClr">
+                <a:tint val="93000"/>
+                <a:satMod val="150000"/>
+                <a:shade val="98000"/>
+                <a:lumMod val="102000"/>
+              </a:schemeClr>
+            </a:gs>
+            <a:gs pos="50000">
+              <a:schemeClr val="phClr">
+                <a:tint val="98000"/>
+                <a:satMod val="130000"/>
+                <a:shade val="90000"/>
+                <a:lumMod val="103000"/>
+              </a:schemeClr>
+            </a:gs>
+            <a:gs pos="100000">
+              <a:schemeClr val="phClr">
+                <a:shade val="63000"/>
+                <a:satMod val="120000"/>
+              </a:schemeClr>
+            </a:gs>
+          </a:gsLst>
+          <a:lin ang="5400000" scaled="0"/>
+        </a:gradFill>
+      </a:bgFillStyleLst>
+    </a:fmtScheme>
+  </a:themeElements>
+  <a:objectDefaults>
+    <a:lnDef>
+      <a:spPr/>
+      <a:bodyPr/>
+      <a:lstStyle/>
+      <a:style>
+        <a:lnRef idx="2">
+          <a:schemeClr val="accent1"/>
+        </a:lnRef>
+        <a:fillRef idx="0">
+          <a:schemeClr val="accent1"/>
+        </a:fillRef>
+        <a:effectRef idx="1">
+          <a:schemeClr val="accent1"/>
+        </a:effectRef>
+        <a:fontRef idx="minor">
+          <a:schemeClr val="tx1"/>
+        </a:fontRef>
+      </a:style>
+    </a:lnDef>
+  </a:objectDefaults>
+  <a:extraClrSchemeLst/>
+  <a:extLst>
+    <a:ext uri="{05A4C25C-085E-4340-85A3-A5531E510DB2}">
+      <thm15:themeFamily xmlns:thm15="http://schemas.microsoft.com/office/thememl/2012/main" name="Office Theme" id="{2E142A2C-CD16-42D6-873A-C26D2A0506FA}" vid="{1BDDFF52-6CD6-40A5-AB3C-68EB2F1E4D0A}"/>
+    </a:ext>
+  </a:extLst>
+</a:theme>
+</file>
+
 <file path=docMetadata/LabelInfo.xml><?xml version="1.0" encoding="utf-8"?>
 <clbl:labelList xmlns:clbl="http://schemas.microsoft.com/office/2020/mipLabelMetadata">
   <clbl:label id="{f42aa342-8706-4288-bd11-ebb85995028c}" enabled="1" method="Standard" siteId="{72f988bf-86f1-41af-91ab-2d7cd011db47}" contentBits="0" removed="0"/>

</xml_diff>

<commit_message>
Working and validated Cameo logic
</commit_message>
<xml_diff>
--- a/ForkPowerPointDeck/ForkPowerPointDeck/SampleInputFile.pptx
+++ b/ForkPowerPointDeck/ForkPowerPointDeck/SampleInputFile.pptx
@@ -5,10 +5,17 @@
     <p:sldMasterId id="2147483648" r:id="rId1"/>
   </p:sldMasterIdLst>
   <p:notesMasterIdLst>
-    <p:notesMasterId r:id="rId3"/>
+    <p:notesMasterId r:id="rId10"/>
   </p:notesMasterIdLst>
   <p:sldIdLst>
     <p:sldId id="256" r:id="rId2"/>
+    <p:sldId id="257" r:id="rId3"/>
+    <p:sldId id="258" r:id="rId4"/>
+    <p:sldId id="259" r:id="rId5"/>
+    <p:sldId id="260" r:id="rId6"/>
+    <p:sldId id="261" r:id="rId7"/>
+    <p:sldId id="262" r:id="rId8"/>
+    <p:sldId id="263" r:id="rId9"/>
   </p:sldIdLst>
   <p:sldSz cx="12192000" cy="6858000"/>
   <p:notesSz cx="6858000" cy="9144000"/>
@@ -197,7 +204,7 @@
           <a:p>
             <a:fld id="{77CE5ABF-444F-4B13-947F-66DBEF03CC8B}" type="datetimeFigureOut">
               <a:rPr lang="en-CA" smtClean="0"/>
-              <a:t>2024-01-26</a:t>
+              <a:t>2024-01-27</a:t>
             </a:fld>
             <a:endParaRPr lang="en-CA"/>
           </a:p>
@@ -558,6 +565,660 @@
 </p:notes>
 </file>
 
+<file path=ppt/notesSlides/notesSlide2.xml><?xml version="1.0" encoding="utf-8"?>
+<p:notes xmlns:a="http://schemas.openxmlformats.org/drawingml/2006/main" xmlns:r="http://schemas.openxmlformats.org/officeDocument/2006/relationships" xmlns:p="http://schemas.openxmlformats.org/presentationml/2006/main">
+  <p:cSld>
+    <p:spTree>
+      <p:nvGrpSpPr>
+        <p:cNvPr id="1" name=""/>
+        <p:cNvGrpSpPr/>
+        <p:nvPr/>
+      </p:nvGrpSpPr>
+      <p:grpSpPr>
+        <a:xfrm>
+          <a:off x="0" y="0"/>
+          <a:ext cx="0" cy="0"/>
+          <a:chOff x="0" y="0"/>
+          <a:chExt cx="0" cy="0"/>
+        </a:xfrm>
+      </p:grpSpPr>
+      <p:sp>
+        <p:nvSpPr>
+          <p:cNvPr id="2" name="Slide Image Placeholder 1"/>
+          <p:cNvSpPr>
+            <a:spLocks noGrp="1" noRot="1" noChangeAspect="1"/>
+          </p:cNvSpPr>
+          <p:nvPr>
+            <p:ph type="sldImg"/>
+          </p:nvPr>
+        </p:nvSpPr>
+        <p:spPr/>
+      </p:sp>
+      <p:sp>
+        <p:nvSpPr>
+          <p:cNvPr id="3" name="Notes Placeholder 2"/>
+          <p:cNvSpPr>
+            <a:spLocks noGrp="1"/>
+          </p:cNvSpPr>
+          <p:nvPr>
+            <p:ph type="body" idx="1"/>
+          </p:nvPr>
+        </p:nvSpPr>
+        <p:spPr/>
+        <p:txBody>
+          <a:bodyPr/>
+          <a:lstStyle/>
+          <a:p>
+            <a:r>
+              <a:rPr lang="en-CA" dirty="0"/>
+              <a:t>{Scenario1}</a:t>
+            </a:r>
+          </a:p>
+          <a:p>
+            <a:r>
+              <a:rPr lang="en-CA" dirty="0"/>
+              <a:t>{Scenario2}</a:t>
+            </a:r>
+          </a:p>
+          <a:p>
+            <a:endParaRPr lang="en-CA" dirty="0"/>
+          </a:p>
+        </p:txBody>
+      </p:sp>
+      <p:sp>
+        <p:nvSpPr>
+          <p:cNvPr id="4" name="Slide Number Placeholder 3"/>
+          <p:cNvSpPr>
+            <a:spLocks noGrp="1"/>
+          </p:cNvSpPr>
+          <p:nvPr>
+            <p:ph type="sldNum" sz="quarter" idx="5"/>
+          </p:nvPr>
+        </p:nvSpPr>
+        <p:spPr/>
+        <p:txBody>
+          <a:bodyPr/>
+          <a:lstStyle/>
+          <a:p>
+            <a:fld id="{3B16528E-AB1C-4F58-8816-0BD9831A77C3}" type="slidenum">
+              <a:rPr lang="en-CA" smtClean="0"/>
+              <a:t>2</a:t>
+            </a:fld>
+            <a:endParaRPr lang="en-CA"/>
+          </a:p>
+        </p:txBody>
+      </p:sp>
+    </p:spTree>
+    <p:extLst>
+      <p:ext uri="{BB962C8B-B14F-4D97-AF65-F5344CB8AC3E}">
+        <p14:creationId xmlns:p14="http://schemas.microsoft.com/office/powerpoint/2010/main" val="453981870"/>
+      </p:ext>
+    </p:extLst>
+  </p:cSld>
+  <p:clrMapOvr>
+    <a:masterClrMapping/>
+  </p:clrMapOvr>
+</p:notes>
+</file>
+
+<file path=ppt/notesSlides/notesSlide3.xml><?xml version="1.0" encoding="utf-8"?>
+<p:notes xmlns:a="http://schemas.openxmlformats.org/drawingml/2006/main" xmlns:r="http://schemas.openxmlformats.org/officeDocument/2006/relationships" xmlns:p="http://schemas.openxmlformats.org/presentationml/2006/main">
+  <p:cSld>
+    <p:spTree>
+      <p:nvGrpSpPr>
+        <p:cNvPr id="1" name=""/>
+        <p:cNvGrpSpPr/>
+        <p:nvPr/>
+      </p:nvGrpSpPr>
+      <p:grpSpPr>
+        <a:xfrm>
+          <a:off x="0" y="0"/>
+          <a:ext cx="0" cy="0"/>
+          <a:chOff x="0" y="0"/>
+          <a:chExt cx="0" cy="0"/>
+        </a:xfrm>
+      </p:grpSpPr>
+      <p:sp>
+        <p:nvSpPr>
+          <p:cNvPr id="2" name="Slide Image Placeholder 1"/>
+          <p:cNvSpPr>
+            <a:spLocks noGrp="1" noRot="1" noChangeAspect="1"/>
+          </p:cNvSpPr>
+          <p:nvPr>
+            <p:ph type="sldImg"/>
+          </p:nvPr>
+        </p:nvSpPr>
+        <p:spPr/>
+      </p:sp>
+      <p:sp>
+        <p:nvSpPr>
+          <p:cNvPr id="3" name="Notes Placeholder 2"/>
+          <p:cNvSpPr>
+            <a:spLocks noGrp="1"/>
+          </p:cNvSpPr>
+          <p:nvPr>
+            <p:ph type="body" idx="1"/>
+          </p:nvPr>
+        </p:nvSpPr>
+        <p:spPr/>
+        <p:txBody>
+          <a:bodyPr/>
+          <a:lstStyle/>
+          <a:p>
+            <a:r>
+              <a:rPr lang="en-CA" dirty="0"/>
+              <a:t>{Scenario1}</a:t>
+            </a:r>
+          </a:p>
+          <a:p>
+            <a:r>
+              <a:rPr lang="en-CA" dirty="0"/>
+              <a:t>{Scenario2}</a:t>
+            </a:r>
+          </a:p>
+          <a:p>
+            <a:endParaRPr lang="en-CA" dirty="0"/>
+          </a:p>
+        </p:txBody>
+      </p:sp>
+      <p:sp>
+        <p:nvSpPr>
+          <p:cNvPr id="4" name="Slide Number Placeholder 3"/>
+          <p:cNvSpPr>
+            <a:spLocks noGrp="1"/>
+          </p:cNvSpPr>
+          <p:nvPr>
+            <p:ph type="sldNum" sz="quarter" idx="5"/>
+          </p:nvPr>
+        </p:nvSpPr>
+        <p:spPr/>
+        <p:txBody>
+          <a:bodyPr/>
+          <a:lstStyle/>
+          <a:p>
+            <a:fld id="{3B16528E-AB1C-4F58-8816-0BD9831A77C3}" type="slidenum">
+              <a:rPr lang="en-CA" smtClean="0"/>
+              <a:t>3</a:t>
+            </a:fld>
+            <a:endParaRPr lang="en-CA"/>
+          </a:p>
+        </p:txBody>
+      </p:sp>
+    </p:spTree>
+    <p:extLst>
+      <p:ext uri="{BB962C8B-B14F-4D97-AF65-F5344CB8AC3E}">
+        <p14:creationId xmlns:p14="http://schemas.microsoft.com/office/powerpoint/2010/main" val="4067840787"/>
+      </p:ext>
+    </p:extLst>
+  </p:cSld>
+  <p:clrMapOvr>
+    <a:masterClrMapping/>
+  </p:clrMapOvr>
+</p:notes>
+</file>
+
+<file path=ppt/notesSlides/notesSlide4.xml><?xml version="1.0" encoding="utf-8"?>
+<p:notes xmlns:a="http://schemas.openxmlformats.org/drawingml/2006/main" xmlns:r="http://schemas.openxmlformats.org/officeDocument/2006/relationships" xmlns:p="http://schemas.openxmlformats.org/presentationml/2006/main">
+  <p:cSld>
+    <p:spTree>
+      <p:nvGrpSpPr>
+        <p:cNvPr id="1" name=""/>
+        <p:cNvGrpSpPr/>
+        <p:nvPr/>
+      </p:nvGrpSpPr>
+      <p:grpSpPr>
+        <a:xfrm>
+          <a:off x="0" y="0"/>
+          <a:ext cx="0" cy="0"/>
+          <a:chOff x="0" y="0"/>
+          <a:chExt cx="0" cy="0"/>
+        </a:xfrm>
+      </p:grpSpPr>
+      <p:sp>
+        <p:nvSpPr>
+          <p:cNvPr id="2" name="Slide Image Placeholder 1"/>
+          <p:cNvSpPr>
+            <a:spLocks noGrp="1" noRot="1" noChangeAspect="1"/>
+          </p:cNvSpPr>
+          <p:nvPr>
+            <p:ph type="sldImg"/>
+          </p:nvPr>
+        </p:nvSpPr>
+        <p:spPr/>
+      </p:sp>
+      <p:sp>
+        <p:nvSpPr>
+          <p:cNvPr id="3" name="Notes Placeholder 2"/>
+          <p:cNvSpPr>
+            <a:spLocks noGrp="1"/>
+          </p:cNvSpPr>
+          <p:nvPr>
+            <p:ph type="body" idx="1"/>
+          </p:nvPr>
+        </p:nvSpPr>
+        <p:spPr/>
+        <p:txBody>
+          <a:bodyPr/>
+          <a:lstStyle/>
+          <a:p>
+            <a:r>
+              <a:rPr lang="en-CA" dirty="0"/>
+              <a:t>{Scenario1}</a:t>
+            </a:r>
+          </a:p>
+          <a:p>
+            <a:r>
+              <a:rPr lang="en-CA" dirty="0"/>
+              <a:t>{Scenario3}</a:t>
+            </a:r>
+          </a:p>
+          <a:p>
+            <a:endParaRPr lang="en-CA" dirty="0"/>
+          </a:p>
+        </p:txBody>
+      </p:sp>
+      <p:sp>
+        <p:nvSpPr>
+          <p:cNvPr id="4" name="Slide Number Placeholder 3"/>
+          <p:cNvSpPr>
+            <a:spLocks noGrp="1"/>
+          </p:cNvSpPr>
+          <p:nvPr>
+            <p:ph type="sldNum" sz="quarter" idx="5"/>
+          </p:nvPr>
+        </p:nvSpPr>
+        <p:spPr/>
+        <p:txBody>
+          <a:bodyPr/>
+          <a:lstStyle/>
+          <a:p>
+            <a:fld id="{3B16528E-AB1C-4F58-8816-0BD9831A77C3}" type="slidenum">
+              <a:rPr lang="en-CA" smtClean="0"/>
+              <a:t>4</a:t>
+            </a:fld>
+            <a:endParaRPr lang="en-CA"/>
+          </a:p>
+        </p:txBody>
+      </p:sp>
+    </p:spTree>
+    <p:extLst>
+      <p:ext uri="{BB962C8B-B14F-4D97-AF65-F5344CB8AC3E}">
+        <p14:creationId xmlns:p14="http://schemas.microsoft.com/office/powerpoint/2010/main" val="3009992057"/>
+      </p:ext>
+    </p:extLst>
+  </p:cSld>
+  <p:clrMapOvr>
+    <a:masterClrMapping/>
+  </p:clrMapOvr>
+</p:notes>
+</file>
+
+<file path=ppt/notesSlides/notesSlide5.xml><?xml version="1.0" encoding="utf-8"?>
+<p:notes xmlns:a="http://schemas.openxmlformats.org/drawingml/2006/main" xmlns:r="http://schemas.openxmlformats.org/officeDocument/2006/relationships" xmlns:p="http://schemas.openxmlformats.org/presentationml/2006/main">
+  <p:cSld>
+    <p:spTree>
+      <p:nvGrpSpPr>
+        <p:cNvPr id="1" name=""/>
+        <p:cNvGrpSpPr/>
+        <p:nvPr/>
+      </p:nvGrpSpPr>
+      <p:grpSpPr>
+        <a:xfrm>
+          <a:off x="0" y="0"/>
+          <a:ext cx="0" cy="0"/>
+          <a:chOff x="0" y="0"/>
+          <a:chExt cx="0" cy="0"/>
+        </a:xfrm>
+      </p:grpSpPr>
+      <p:sp>
+        <p:nvSpPr>
+          <p:cNvPr id="2" name="Slide Image Placeholder 1"/>
+          <p:cNvSpPr>
+            <a:spLocks noGrp="1" noRot="1" noChangeAspect="1"/>
+          </p:cNvSpPr>
+          <p:nvPr>
+            <p:ph type="sldImg"/>
+          </p:nvPr>
+        </p:nvSpPr>
+        <p:spPr/>
+      </p:sp>
+      <p:sp>
+        <p:nvSpPr>
+          <p:cNvPr id="3" name="Notes Placeholder 2"/>
+          <p:cNvSpPr>
+            <a:spLocks noGrp="1"/>
+          </p:cNvSpPr>
+          <p:nvPr>
+            <p:ph type="body" idx="1"/>
+          </p:nvPr>
+        </p:nvSpPr>
+        <p:spPr/>
+        <p:txBody>
+          <a:bodyPr/>
+          <a:lstStyle/>
+          <a:p>
+            <a:r>
+              <a:rPr lang="en-CA" dirty="0"/>
+              <a:t>{Scenario1}</a:t>
+            </a:r>
+          </a:p>
+          <a:p>
+            <a:endParaRPr lang="en-CA" dirty="0"/>
+          </a:p>
+          <a:p>
+            <a:endParaRPr lang="en-CA" dirty="0"/>
+          </a:p>
+        </p:txBody>
+      </p:sp>
+      <p:sp>
+        <p:nvSpPr>
+          <p:cNvPr id="4" name="Slide Number Placeholder 3"/>
+          <p:cNvSpPr>
+            <a:spLocks noGrp="1"/>
+          </p:cNvSpPr>
+          <p:nvPr>
+            <p:ph type="sldNum" sz="quarter" idx="5"/>
+          </p:nvPr>
+        </p:nvSpPr>
+        <p:spPr/>
+        <p:txBody>
+          <a:bodyPr/>
+          <a:lstStyle/>
+          <a:p>
+            <a:fld id="{3B16528E-AB1C-4F58-8816-0BD9831A77C3}" type="slidenum">
+              <a:rPr lang="en-CA" smtClean="0"/>
+              <a:t>5</a:t>
+            </a:fld>
+            <a:endParaRPr lang="en-CA"/>
+          </a:p>
+        </p:txBody>
+      </p:sp>
+    </p:spTree>
+    <p:extLst>
+      <p:ext uri="{BB962C8B-B14F-4D97-AF65-F5344CB8AC3E}">
+        <p14:creationId xmlns:p14="http://schemas.microsoft.com/office/powerpoint/2010/main" val="1012379495"/>
+      </p:ext>
+    </p:extLst>
+  </p:cSld>
+  <p:clrMapOvr>
+    <a:masterClrMapping/>
+  </p:clrMapOvr>
+</p:notes>
+</file>
+
+<file path=ppt/notesSlides/notesSlide6.xml><?xml version="1.0" encoding="utf-8"?>
+<p:notes xmlns:a="http://schemas.openxmlformats.org/drawingml/2006/main" xmlns:r="http://schemas.openxmlformats.org/officeDocument/2006/relationships" xmlns:p="http://schemas.openxmlformats.org/presentationml/2006/main">
+  <p:cSld>
+    <p:spTree>
+      <p:nvGrpSpPr>
+        <p:cNvPr id="1" name=""/>
+        <p:cNvGrpSpPr/>
+        <p:nvPr/>
+      </p:nvGrpSpPr>
+      <p:grpSpPr>
+        <a:xfrm>
+          <a:off x="0" y="0"/>
+          <a:ext cx="0" cy="0"/>
+          <a:chOff x="0" y="0"/>
+          <a:chExt cx="0" cy="0"/>
+        </a:xfrm>
+      </p:grpSpPr>
+      <p:sp>
+        <p:nvSpPr>
+          <p:cNvPr id="2" name="Slide Image Placeholder 1"/>
+          <p:cNvSpPr>
+            <a:spLocks noGrp="1" noRot="1" noChangeAspect="1"/>
+          </p:cNvSpPr>
+          <p:nvPr>
+            <p:ph type="sldImg"/>
+          </p:nvPr>
+        </p:nvSpPr>
+        <p:spPr/>
+      </p:sp>
+      <p:sp>
+        <p:nvSpPr>
+          <p:cNvPr id="3" name="Notes Placeholder 2"/>
+          <p:cNvSpPr>
+            <a:spLocks noGrp="1"/>
+          </p:cNvSpPr>
+          <p:nvPr>
+            <p:ph type="body" idx="1"/>
+          </p:nvPr>
+        </p:nvSpPr>
+        <p:spPr/>
+        <p:txBody>
+          <a:bodyPr/>
+          <a:lstStyle/>
+          <a:p>
+            <a:r>
+              <a:rPr lang="en-CA" dirty="0"/>
+              <a:t>{Scenario1}</a:t>
+            </a:r>
+          </a:p>
+          <a:p>
+            <a:endParaRPr lang="en-CA" dirty="0"/>
+          </a:p>
+          <a:p>
+            <a:endParaRPr lang="en-CA" dirty="0"/>
+          </a:p>
+        </p:txBody>
+      </p:sp>
+      <p:sp>
+        <p:nvSpPr>
+          <p:cNvPr id="4" name="Slide Number Placeholder 3"/>
+          <p:cNvSpPr>
+            <a:spLocks noGrp="1"/>
+          </p:cNvSpPr>
+          <p:nvPr>
+            <p:ph type="sldNum" sz="quarter" idx="5"/>
+          </p:nvPr>
+        </p:nvSpPr>
+        <p:spPr/>
+        <p:txBody>
+          <a:bodyPr/>
+          <a:lstStyle/>
+          <a:p>
+            <a:fld id="{3B16528E-AB1C-4F58-8816-0BD9831A77C3}" type="slidenum">
+              <a:rPr lang="en-CA" smtClean="0"/>
+              <a:t>6</a:t>
+            </a:fld>
+            <a:endParaRPr lang="en-CA"/>
+          </a:p>
+        </p:txBody>
+      </p:sp>
+    </p:spTree>
+    <p:extLst>
+      <p:ext uri="{BB962C8B-B14F-4D97-AF65-F5344CB8AC3E}">
+        <p14:creationId xmlns:p14="http://schemas.microsoft.com/office/powerpoint/2010/main" val="3437024378"/>
+      </p:ext>
+    </p:extLst>
+  </p:cSld>
+  <p:clrMapOvr>
+    <a:masterClrMapping/>
+  </p:clrMapOvr>
+</p:notes>
+</file>
+
+<file path=ppt/notesSlides/notesSlide7.xml><?xml version="1.0" encoding="utf-8"?>
+<p:notes xmlns:a="http://schemas.openxmlformats.org/drawingml/2006/main" xmlns:r="http://schemas.openxmlformats.org/officeDocument/2006/relationships" xmlns:p="http://schemas.openxmlformats.org/presentationml/2006/main">
+  <p:cSld>
+    <p:spTree>
+      <p:nvGrpSpPr>
+        <p:cNvPr id="1" name=""/>
+        <p:cNvGrpSpPr/>
+        <p:nvPr/>
+      </p:nvGrpSpPr>
+      <p:grpSpPr>
+        <a:xfrm>
+          <a:off x="0" y="0"/>
+          <a:ext cx="0" cy="0"/>
+          <a:chOff x="0" y="0"/>
+          <a:chExt cx="0" cy="0"/>
+        </a:xfrm>
+      </p:grpSpPr>
+      <p:sp>
+        <p:nvSpPr>
+          <p:cNvPr id="2" name="Slide Image Placeholder 1"/>
+          <p:cNvSpPr>
+            <a:spLocks noGrp="1" noRot="1" noChangeAspect="1"/>
+          </p:cNvSpPr>
+          <p:nvPr>
+            <p:ph type="sldImg"/>
+          </p:nvPr>
+        </p:nvSpPr>
+        <p:spPr/>
+      </p:sp>
+      <p:sp>
+        <p:nvSpPr>
+          <p:cNvPr id="3" name="Notes Placeholder 2"/>
+          <p:cNvSpPr>
+            <a:spLocks noGrp="1"/>
+          </p:cNvSpPr>
+          <p:nvPr>
+            <p:ph type="body" idx="1"/>
+          </p:nvPr>
+        </p:nvSpPr>
+        <p:spPr/>
+        <p:txBody>
+          <a:bodyPr/>
+          <a:lstStyle/>
+          <a:p>
+            <a:r>
+              <a:rPr lang="en-CA" dirty="0"/>
+              <a:t>{Scenario1}</a:t>
+            </a:r>
+          </a:p>
+          <a:p>
+            <a:endParaRPr lang="en-CA" dirty="0"/>
+          </a:p>
+          <a:p>
+            <a:endParaRPr lang="en-CA" dirty="0"/>
+          </a:p>
+        </p:txBody>
+      </p:sp>
+      <p:sp>
+        <p:nvSpPr>
+          <p:cNvPr id="4" name="Slide Number Placeholder 3"/>
+          <p:cNvSpPr>
+            <a:spLocks noGrp="1"/>
+          </p:cNvSpPr>
+          <p:nvPr>
+            <p:ph type="sldNum" sz="quarter" idx="5"/>
+          </p:nvPr>
+        </p:nvSpPr>
+        <p:spPr/>
+        <p:txBody>
+          <a:bodyPr/>
+          <a:lstStyle/>
+          <a:p>
+            <a:fld id="{3B16528E-AB1C-4F58-8816-0BD9831A77C3}" type="slidenum">
+              <a:rPr lang="en-CA" smtClean="0"/>
+              <a:t>7</a:t>
+            </a:fld>
+            <a:endParaRPr lang="en-CA"/>
+          </a:p>
+        </p:txBody>
+      </p:sp>
+    </p:spTree>
+    <p:extLst>
+      <p:ext uri="{BB962C8B-B14F-4D97-AF65-F5344CB8AC3E}">
+        <p14:creationId xmlns:p14="http://schemas.microsoft.com/office/powerpoint/2010/main" val="1465090776"/>
+      </p:ext>
+    </p:extLst>
+  </p:cSld>
+  <p:clrMapOvr>
+    <a:masterClrMapping/>
+  </p:clrMapOvr>
+</p:notes>
+</file>
+
+<file path=ppt/notesSlides/notesSlide8.xml><?xml version="1.0" encoding="utf-8"?>
+<p:notes xmlns:a="http://schemas.openxmlformats.org/drawingml/2006/main" xmlns:r="http://schemas.openxmlformats.org/officeDocument/2006/relationships" xmlns:p="http://schemas.openxmlformats.org/presentationml/2006/main">
+  <p:cSld>
+    <p:spTree>
+      <p:nvGrpSpPr>
+        <p:cNvPr id="1" name=""/>
+        <p:cNvGrpSpPr/>
+        <p:nvPr/>
+      </p:nvGrpSpPr>
+      <p:grpSpPr>
+        <a:xfrm>
+          <a:off x="0" y="0"/>
+          <a:ext cx="0" cy="0"/>
+          <a:chOff x="0" y="0"/>
+          <a:chExt cx="0" cy="0"/>
+        </a:xfrm>
+      </p:grpSpPr>
+      <p:sp>
+        <p:nvSpPr>
+          <p:cNvPr id="2" name="Slide Image Placeholder 1"/>
+          <p:cNvSpPr>
+            <a:spLocks noGrp="1" noRot="1" noChangeAspect="1"/>
+          </p:cNvSpPr>
+          <p:nvPr>
+            <p:ph type="sldImg"/>
+          </p:nvPr>
+        </p:nvSpPr>
+        <p:spPr/>
+      </p:sp>
+      <p:sp>
+        <p:nvSpPr>
+          <p:cNvPr id="3" name="Notes Placeholder 2"/>
+          <p:cNvSpPr>
+            <a:spLocks noGrp="1"/>
+          </p:cNvSpPr>
+          <p:nvPr>
+            <p:ph type="body" idx="1"/>
+          </p:nvPr>
+        </p:nvSpPr>
+        <p:spPr/>
+        <p:txBody>
+          <a:bodyPr/>
+          <a:lstStyle/>
+          <a:p>
+            <a:r>
+              <a:rPr lang="en-CA" dirty="0"/>
+              <a:t>{Scenario3}</a:t>
+            </a:r>
+          </a:p>
+        </p:txBody>
+      </p:sp>
+      <p:sp>
+        <p:nvSpPr>
+          <p:cNvPr id="4" name="Slide Number Placeholder 3"/>
+          <p:cNvSpPr>
+            <a:spLocks noGrp="1"/>
+          </p:cNvSpPr>
+          <p:nvPr>
+            <p:ph type="sldNum" sz="quarter" idx="5"/>
+          </p:nvPr>
+        </p:nvSpPr>
+        <p:spPr/>
+        <p:txBody>
+          <a:bodyPr/>
+          <a:lstStyle/>
+          <a:p>
+            <a:fld id="{3B16528E-AB1C-4F58-8816-0BD9831A77C3}" type="slidenum">
+              <a:rPr lang="en-CA" smtClean="0"/>
+              <a:t>8</a:t>
+            </a:fld>
+            <a:endParaRPr lang="en-CA"/>
+          </a:p>
+        </p:txBody>
+      </p:sp>
+    </p:spTree>
+    <p:extLst>
+      <p:ext uri="{BB962C8B-B14F-4D97-AF65-F5344CB8AC3E}">
+        <p14:creationId xmlns:p14="http://schemas.microsoft.com/office/powerpoint/2010/main" val="1098588987"/>
+      </p:ext>
+    </p:extLst>
+  </p:cSld>
+  <p:clrMapOvr>
+    <a:masterClrMapping/>
+  </p:clrMapOvr>
+</p:notes>
+</file>
+
 <file path=ppt/slideLayouts/slideLayout1.xml><?xml version="1.0" encoding="utf-8"?>
 <p:sldLayout xmlns:a="http://schemas.openxmlformats.org/drawingml/2006/main" xmlns:r="http://schemas.openxmlformats.org/officeDocument/2006/relationships" xmlns:p="http://schemas.openxmlformats.org/presentationml/2006/main" type="title" preserve="1">
   <p:cSld name="Title Slide">
@@ -705,7 +1366,7 @@
           <a:p>
             <a:fld id="{12ED1E1D-55A8-4AE9-857D-DA50F874C535}" type="datetimeFigureOut">
               <a:rPr lang="en-US" smtClean="0"/>
-              <a:t>1/26/2024</a:t>
+              <a:t>1/27/2024</a:t>
             </a:fld>
             <a:endParaRPr lang="en-US"/>
           </a:p>
@@ -903,7 +1564,7 @@
           <a:p>
             <a:fld id="{12ED1E1D-55A8-4AE9-857D-DA50F874C535}" type="datetimeFigureOut">
               <a:rPr lang="en-US" smtClean="0"/>
-              <a:t>1/26/2024</a:t>
+              <a:t>1/27/2024</a:t>
             </a:fld>
             <a:endParaRPr lang="en-US"/>
           </a:p>
@@ -1111,7 +1772,7 @@
           <a:p>
             <a:fld id="{12ED1E1D-55A8-4AE9-857D-DA50F874C535}" type="datetimeFigureOut">
               <a:rPr lang="en-US" smtClean="0"/>
-              <a:t>1/26/2024</a:t>
+              <a:t>1/27/2024</a:t>
             </a:fld>
             <a:endParaRPr lang="en-US"/>
           </a:p>
@@ -1309,7 +1970,7 @@
           <a:p>
             <a:fld id="{12ED1E1D-55A8-4AE9-857D-DA50F874C535}" type="datetimeFigureOut">
               <a:rPr lang="en-US" smtClean="0"/>
-              <a:t>1/26/2024</a:t>
+              <a:t>1/27/2024</a:t>
             </a:fld>
             <a:endParaRPr lang="en-US"/>
           </a:p>
@@ -1584,7 +2245,7 @@
           <a:p>
             <a:fld id="{12ED1E1D-55A8-4AE9-857D-DA50F874C535}" type="datetimeFigureOut">
               <a:rPr lang="en-US" smtClean="0"/>
-              <a:t>1/26/2024</a:t>
+              <a:t>1/27/2024</a:t>
             </a:fld>
             <a:endParaRPr lang="en-US"/>
           </a:p>
@@ -1849,7 +2510,7 @@
           <a:p>
             <a:fld id="{12ED1E1D-55A8-4AE9-857D-DA50F874C535}" type="datetimeFigureOut">
               <a:rPr lang="en-US" smtClean="0"/>
-              <a:t>1/26/2024</a:t>
+              <a:t>1/27/2024</a:t>
             </a:fld>
             <a:endParaRPr lang="en-US"/>
           </a:p>
@@ -2261,7 +2922,7 @@
           <a:p>
             <a:fld id="{12ED1E1D-55A8-4AE9-857D-DA50F874C535}" type="datetimeFigureOut">
               <a:rPr lang="en-US" smtClean="0"/>
-              <a:t>1/26/2024</a:t>
+              <a:t>1/27/2024</a:t>
             </a:fld>
             <a:endParaRPr lang="en-US"/>
           </a:p>
@@ -2402,7 +3063,7 @@
           <a:p>
             <a:fld id="{12ED1E1D-55A8-4AE9-857D-DA50F874C535}" type="datetimeFigureOut">
               <a:rPr lang="en-US" smtClean="0"/>
-              <a:t>1/26/2024</a:t>
+              <a:t>1/27/2024</a:t>
             </a:fld>
             <a:endParaRPr lang="en-US"/>
           </a:p>
@@ -2515,7 +3176,7 @@
           <a:p>
             <a:fld id="{12ED1E1D-55A8-4AE9-857D-DA50F874C535}" type="datetimeFigureOut">
               <a:rPr lang="en-US" smtClean="0"/>
-              <a:t>1/26/2024</a:t>
+              <a:t>1/27/2024</a:t>
             </a:fld>
             <a:endParaRPr lang="en-US"/>
           </a:p>
@@ -2826,7 +3487,7 @@
           <a:p>
             <a:fld id="{12ED1E1D-55A8-4AE9-857D-DA50F874C535}" type="datetimeFigureOut">
               <a:rPr lang="en-US" smtClean="0"/>
-              <a:t>1/26/2024</a:t>
+              <a:t>1/27/2024</a:t>
             </a:fld>
             <a:endParaRPr lang="en-US"/>
           </a:p>
@@ -3114,7 +3775,7 @@
           <a:p>
             <a:fld id="{12ED1E1D-55A8-4AE9-857D-DA50F874C535}" type="datetimeFigureOut">
               <a:rPr lang="en-US" smtClean="0"/>
-              <a:t>1/26/2024</a:t>
+              <a:t>1/27/2024</a:t>
             </a:fld>
             <a:endParaRPr lang="en-US"/>
           </a:p>
@@ -3355,7 +4016,7 @@
           <a:p>
             <a:fld id="{12ED1E1D-55A8-4AE9-857D-DA50F874C535}" type="datetimeFigureOut">
               <a:rPr lang="en-US" smtClean="0"/>
-              <a:t>1/26/2024</a:t>
+              <a:t>1/27/2024</a:t>
             </a:fld>
             <a:endParaRPr lang="en-US"/>
           </a:p>
@@ -3822,10 +4483,10 @@
       </p:sp>
       <p:pic>
         <p:nvPicPr>
-          <p:cNvPr id="2" name="Camera 1">
-            <a:extLst>
-              <a:ext uri="{FF2B5EF4-FFF2-40B4-BE49-F238E27FC236}">
-                <a16:creationId xmlns:a16="http://schemas.microsoft.com/office/drawing/2014/main" id="{AA385057-638F-50F1-A7F4-D28977B3D52D}"/>
+          <p:cNvPr id="3" name="Camera 2">
+            <a:extLst>
+              <a:ext uri="{FF2B5EF4-FFF2-40B4-BE49-F238E27FC236}">
+                <a16:creationId xmlns:a16="http://schemas.microsoft.com/office/drawing/2014/main" id="{F70D67D2-F04B-4C33-51CA-C39B33FBA895}"/>
               </a:ext>
             </a:extLst>
           </p:cNvPr>
@@ -3865,6 +4526,758 @@
     <p:extLst>
       <p:ext uri="{BB962C8B-B14F-4D97-AF65-F5344CB8AC3E}">
         <p14:creationId xmlns:p14="http://schemas.microsoft.com/office/powerpoint/2010/main" val="3595791136"/>
+      </p:ext>
+    </p:extLst>
+  </p:cSld>
+  <p:clrMapOvr>
+    <a:masterClrMapping/>
+  </p:clrMapOvr>
+</p:sld>
+</file>
+
+<file path=ppt/slides/slide2.xml><?xml version="1.0" encoding="utf-8"?>
+<p:sld xmlns:a="http://schemas.openxmlformats.org/drawingml/2006/main" xmlns:r="http://schemas.openxmlformats.org/officeDocument/2006/relationships" xmlns:p="http://schemas.openxmlformats.org/presentationml/2006/main">
+  <p:cSld>
+    <p:spTree>
+      <p:nvGrpSpPr>
+        <p:cNvPr id="1" name="">
+          <a:extLst>
+            <a:ext uri="{FF2B5EF4-FFF2-40B4-BE49-F238E27FC236}">
+              <a16:creationId xmlns:a16="http://schemas.microsoft.com/office/drawing/2014/main" id="{4DBCDE62-ACA2-09FF-B589-F431D922167A}"/>
+            </a:ext>
+          </a:extLst>
+        </p:cNvPr>
+        <p:cNvGrpSpPr/>
+        <p:nvPr/>
+      </p:nvGrpSpPr>
+      <p:grpSpPr>
+        <a:xfrm>
+          <a:off x="0" y="0"/>
+          <a:ext cx="0" cy="0"/>
+          <a:chOff x="0" y="0"/>
+          <a:chExt cx="0" cy="0"/>
+        </a:xfrm>
+      </p:grpSpPr>
+      <p:sp>
+        <p:nvSpPr>
+          <p:cNvPr id="4" name="Rectangle 3">
+            <a:extLst>
+              <a:ext uri="{FF2B5EF4-FFF2-40B4-BE49-F238E27FC236}">
+                <a16:creationId xmlns:a16="http://schemas.microsoft.com/office/drawing/2014/main" id="{9BF64969-7EFE-EA96-AAE2-84DFD6C01498}"/>
+              </a:ext>
+            </a:extLst>
+          </p:cNvPr>
+          <p:cNvSpPr/>
+          <p:nvPr/>
+        </p:nvSpPr>
+        <p:spPr>
+          <a:xfrm>
+            <a:off x="5818520" y="3017520"/>
+            <a:ext cx="554959" cy="923330"/>
+          </a:xfrm>
+          <a:prstGeom prst="rect">
+            <a:avLst/>
+          </a:prstGeom>
+          <a:noFill/>
+        </p:spPr>
+        <p:txBody>
+          <a:bodyPr wrap="none" lIns="91440" tIns="45720" rIns="91440" bIns="45720">
+            <a:spAutoFit/>
+          </a:bodyPr>
+          <a:lstStyle/>
+          <a:p>
+            <a:pPr algn="ctr"/>
+            <a:r>
+              <a:rPr lang="en-US" sz="5400" b="0" cap="none" spc="0" dirty="0">
+                <a:ln w="0"/>
+                <a:solidFill>
+                  <a:schemeClr val="tx1"/>
+                </a:solidFill>
+                <a:effectLst>
+                  <a:outerShdw blurRad="38100" dist="19050" dir="2700000" algn="tl" rotWithShape="0">
+                    <a:schemeClr val="dk1">
+                      <a:alpha val="40000"/>
+                    </a:schemeClr>
+                  </a:outerShdw>
+                </a:effectLst>
+              </a:rPr>
+              <a:t>2</a:t>
+            </a:r>
+          </a:p>
+        </p:txBody>
+      </p:sp>
+    </p:spTree>
+    <p:extLst>
+      <p:ext uri="{BB962C8B-B14F-4D97-AF65-F5344CB8AC3E}">
+        <p14:creationId xmlns:p14="http://schemas.microsoft.com/office/powerpoint/2010/main" val="3885739986"/>
+      </p:ext>
+    </p:extLst>
+  </p:cSld>
+  <p:clrMapOvr>
+    <a:masterClrMapping/>
+  </p:clrMapOvr>
+</p:sld>
+</file>
+
+<file path=ppt/slides/slide3.xml><?xml version="1.0" encoding="utf-8"?>
+<p:sld xmlns:a="http://schemas.openxmlformats.org/drawingml/2006/main" xmlns:r="http://schemas.openxmlformats.org/officeDocument/2006/relationships" xmlns:p="http://schemas.openxmlformats.org/presentationml/2006/main">
+  <p:cSld>
+    <p:spTree>
+      <p:nvGrpSpPr>
+        <p:cNvPr id="1" name="">
+          <a:extLst>
+            <a:ext uri="{FF2B5EF4-FFF2-40B4-BE49-F238E27FC236}">
+              <a16:creationId xmlns:a16="http://schemas.microsoft.com/office/drawing/2014/main" id="{B81AC39F-1484-209F-6593-2DCABB21A991}"/>
+            </a:ext>
+          </a:extLst>
+        </p:cNvPr>
+        <p:cNvGrpSpPr/>
+        <p:nvPr/>
+      </p:nvGrpSpPr>
+      <p:grpSpPr>
+        <a:xfrm>
+          <a:off x="0" y="0"/>
+          <a:ext cx="0" cy="0"/>
+          <a:chOff x="0" y="0"/>
+          <a:chExt cx="0" cy="0"/>
+        </a:xfrm>
+      </p:grpSpPr>
+      <p:sp>
+        <p:nvSpPr>
+          <p:cNvPr id="4" name="Rectangle 3">
+            <a:extLst>
+              <a:ext uri="{FF2B5EF4-FFF2-40B4-BE49-F238E27FC236}">
+                <a16:creationId xmlns:a16="http://schemas.microsoft.com/office/drawing/2014/main" id="{21F8322B-9FBE-156E-0C5B-0F10DEB9E195}"/>
+              </a:ext>
+            </a:extLst>
+          </p:cNvPr>
+          <p:cNvSpPr/>
+          <p:nvPr/>
+        </p:nvSpPr>
+        <p:spPr>
+          <a:xfrm>
+            <a:off x="5818519" y="3017520"/>
+            <a:ext cx="554960" cy="923330"/>
+          </a:xfrm>
+          <a:prstGeom prst="rect">
+            <a:avLst/>
+          </a:prstGeom>
+          <a:noFill/>
+        </p:spPr>
+        <p:txBody>
+          <a:bodyPr wrap="none" lIns="91440" tIns="45720" rIns="91440" bIns="45720">
+            <a:spAutoFit/>
+          </a:bodyPr>
+          <a:lstStyle/>
+          <a:p>
+            <a:pPr algn="ctr"/>
+            <a:r>
+              <a:rPr lang="en-US" sz="5400" b="0" cap="none" spc="0" dirty="0">
+                <a:ln w="0"/>
+                <a:solidFill>
+                  <a:schemeClr val="tx1"/>
+                </a:solidFill>
+                <a:effectLst>
+                  <a:outerShdw blurRad="38100" dist="19050" dir="2700000" algn="tl" rotWithShape="0">
+                    <a:schemeClr val="dk1">
+                      <a:alpha val="40000"/>
+                    </a:schemeClr>
+                  </a:outerShdw>
+                </a:effectLst>
+              </a:rPr>
+              <a:t>3</a:t>
+            </a:r>
+          </a:p>
+        </p:txBody>
+      </p:sp>
+    </p:spTree>
+    <p:extLst>
+      <p:ext uri="{BB962C8B-B14F-4D97-AF65-F5344CB8AC3E}">
+        <p14:creationId xmlns:p14="http://schemas.microsoft.com/office/powerpoint/2010/main" val="2859738929"/>
+      </p:ext>
+    </p:extLst>
+  </p:cSld>
+  <p:clrMapOvr>
+    <a:masterClrMapping/>
+  </p:clrMapOvr>
+</p:sld>
+</file>
+
+<file path=ppt/slides/slide4.xml><?xml version="1.0" encoding="utf-8"?>
+<p:sld xmlns:a="http://schemas.openxmlformats.org/drawingml/2006/main" xmlns:r="http://schemas.openxmlformats.org/officeDocument/2006/relationships" xmlns:p="http://schemas.openxmlformats.org/presentationml/2006/main">
+  <p:cSld>
+    <p:spTree>
+      <p:nvGrpSpPr>
+        <p:cNvPr id="1" name="">
+          <a:extLst>
+            <a:ext uri="{FF2B5EF4-FFF2-40B4-BE49-F238E27FC236}">
+              <a16:creationId xmlns:a16="http://schemas.microsoft.com/office/drawing/2014/main" id="{7DABCDC9-7917-CA8C-6C46-BACC46C1CBBD}"/>
+            </a:ext>
+          </a:extLst>
+        </p:cNvPr>
+        <p:cNvGrpSpPr/>
+        <p:nvPr/>
+      </p:nvGrpSpPr>
+      <p:grpSpPr>
+        <a:xfrm>
+          <a:off x="0" y="0"/>
+          <a:ext cx="0" cy="0"/>
+          <a:chOff x="0" y="0"/>
+          <a:chExt cx="0" cy="0"/>
+        </a:xfrm>
+      </p:grpSpPr>
+      <p:sp>
+        <p:nvSpPr>
+          <p:cNvPr id="4" name="Rectangle 3">
+            <a:extLst>
+              <a:ext uri="{FF2B5EF4-FFF2-40B4-BE49-F238E27FC236}">
+                <a16:creationId xmlns:a16="http://schemas.microsoft.com/office/drawing/2014/main" id="{CE7CF609-5965-2F4C-43A1-A6792151D089}"/>
+              </a:ext>
+            </a:extLst>
+          </p:cNvPr>
+          <p:cNvSpPr/>
+          <p:nvPr/>
+        </p:nvSpPr>
+        <p:spPr>
+          <a:xfrm>
+            <a:off x="5818520" y="3017520"/>
+            <a:ext cx="554959" cy="923330"/>
+          </a:xfrm>
+          <a:prstGeom prst="rect">
+            <a:avLst/>
+          </a:prstGeom>
+          <a:noFill/>
+        </p:spPr>
+        <p:txBody>
+          <a:bodyPr wrap="none" lIns="91440" tIns="45720" rIns="91440" bIns="45720">
+            <a:spAutoFit/>
+          </a:bodyPr>
+          <a:lstStyle/>
+          <a:p>
+            <a:pPr algn="ctr"/>
+            <a:r>
+              <a:rPr lang="en-US" sz="5400" b="0" cap="none" spc="0" dirty="0">
+                <a:ln w="0"/>
+                <a:solidFill>
+                  <a:schemeClr val="tx1"/>
+                </a:solidFill>
+                <a:effectLst>
+                  <a:outerShdw blurRad="38100" dist="19050" dir="2700000" algn="tl" rotWithShape="0">
+                    <a:schemeClr val="dk1">
+                      <a:alpha val="40000"/>
+                    </a:schemeClr>
+                  </a:outerShdw>
+                </a:effectLst>
+              </a:rPr>
+              <a:t>4</a:t>
+            </a:r>
+          </a:p>
+        </p:txBody>
+      </p:sp>
+      <p:pic>
+        <p:nvPicPr>
+          <p:cNvPr id="2" name="Camera 1">
+            <a:extLst>
+              <a:ext uri="{FF2B5EF4-FFF2-40B4-BE49-F238E27FC236}">
+                <a16:creationId xmlns:a16="http://schemas.microsoft.com/office/drawing/2014/main" id="{867207BC-F2B4-84D3-AA77-18A8C21BECBE}"/>
+              </a:ext>
+            </a:extLst>
+          </p:cNvPr>
+          <p:cNvPicPr>
+            <a:picLocks noChangeAspect="1"/>
+            <a:extLst>
+              <a:ext uri="{51228E76-BA90-4043-B771-695A4F85340A}">
+                <alf:liveFeedProps xmlns:alf="http://schemas.microsoft.com/office/drawing/2021/livefeed"/>
+              </a:ext>
+            </a:extLst>
+          </p:cNvPicPr>
+          <p:nvPr/>
+        </p:nvPicPr>
+        <p:blipFill>
+          <a:blip r:embed="rId3">
+            <a:extLst>
+              <a:ext uri="{96DAC541-7B7A-43D3-8B79-37D633B846F1}">
+                <asvg:svgBlip xmlns:asvg="http://schemas.microsoft.com/office/drawing/2016/SVG/main" r:embed="rId4"/>
+              </a:ext>
+            </a:extLst>
+          </a:blip>
+          <a:stretch>
+            <a:fillRect/>
+          </a:stretch>
+        </p:blipFill>
+        <p:spPr>
+          <a:xfrm>
+            <a:off x="10052304" y="4718304"/>
+            <a:ext cx="2057400" cy="2057400"/>
+          </a:xfrm>
+          <a:prstGeom prst="ellipse">
+            <a:avLst/>
+          </a:prstGeom>
+        </p:spPr>
+      </p:pic>
+    </p:spTree>
+    <p:extLst>
+      <p:ext uri="{BB962C8B-B14F-4D97-AF65-F5344CB8AC3E}">
+        <p14:creationId xmlns:p14="http://schemas.microsoft.com/office/powerpoint/2010/main" val="119810103"/>
+      </p:ext>
+    </p:extLst>
+  </p:cSld>
+  <p:clrMapOvr>
+    <a:masterClrMapping/>
+  </p:clrMapOvr>
+</p:sld>
+</file>
+
+<file path=ppt/slides/slide5.xml><?xml version="1.0" encoding="utf-8"?>
+<p:sld xmlns:a="http://schemas.openxmlformats.org/drawingml/2006/main" xmlns:r="http://schemas.openxmlformats.org/officeDocument/2006/relationships" xmlns:p="http://schemas.openxmlformats.org/presentationml/2006/main">
+  <p:cSld>
+    <p:spTree>
+      <p:nvGrpSpPr>
+        <p:cNvPr id="1" name="">
+          <a:extLst>
+            <a:ext uri="{FF2B5EF4-FFF2-40B4-BE49-F238E27FC236}">
+              <a16:creationId xmlns:a16="http://schemas.microsoft.com/office/drawing/2014/main" id="{A498FCC3-3C32-86F0-909E-8BFC20A84E01}"/>
+            </a:ext>
+          </a:extLst>
+        </p:cNvPr>
+        <p:cNvGrpSpPr/>
+        <p:nvPr/>
+      </p:nvGrpSpPr>
+      <p:grpSpPr>
+        <a:xfrm>
+          <a:off x="0" y="0"/>
+          <a:ext cx="0" cy="0"/>
+          <a:chOff x="0" y="0"/>
+          <a:chExt cx="0" cy="0"/>
+        </a:xfrm>
+      </p:grpSpPr>
+      <p:sp>
+        <p:nvSpPr>
+          <p:cNvPr id="4" name="Rectangle 3">
+            <a:extLst>
+              <a:ext uri="{FF2B5EF4-FFF2-40B4-BE49-F238E27FC236}">
+                <a16:creationId xmlns:a16="http://schemas.microsoft.com/office/drawing/2014/main" id="{88D2F331-E7A5-3C48-175C-7310664AEA46}"/>
+              </a:ext>
+            </a:extLst>
+          </p:cNvPr>
+          <p:cNvSpPr/>
+          <p:nvPr/>
+        </p:nvSpPr>
+        <p:spPr>
+          <a:xfrm>
+            <a:off x="5818520" y="3017520"/>
+            <a:ext cx="554959" cy="923330"/>
+          </a:xfrm>
+          <a:prstGeom prst="rect">
+            <a:avLst/>
+          </a:prstGeom>
+          <a:noFill/>
+        </p:spPr>
+        <p:txBody>
+          <a:bodyPr wrap="none" lIns="91440" tIns="45720" rIns="91440" bIns="45720">
+            <a:spAutoFit/>
+          </a:bodyPr>
+          <a:lstStyle/>
+          <a:p>
+            <a:pPr algn="ctr"/>
+            <a:r>
+              <a:rPr lang="en-US" sz="5400" b="0" cap="none" spc="0" dirty="0">
+                <a:ln w="0"/>
+                <a:solidFill>
+                  <a:schemeClr val="tx1"/>
+                </a:solidFill>
+                <a:effectLst>
+                  <a:outerShdw blurRad="38100" dist="19050" dir="2700000" algn="tl" rotWithShape="0">
+                    <a:schemeClr val="dk1">
+                      <a:alpha val="40000"/>
+                    </a:schemeClr>
+                  </a:outerShdw>
+                </a:effectLst>
+              </a:rPr>
+              <a:t>5</a:t>
+            </a:r>
+          </a:p>
+        </p:txBody>
+      </p:sp>
+    </p:spTree>
+    <p:extLst>
+      <p:ext uri="{BB962C8B-B14F-4D97-AF65-F5344CB8AC3E}">
+        <p14:creationId xmlns:p14="http://schemas.microsoft.com/office/powerpoint/2010/main" val="2879831067"/>
+      </p:ext>
+    </p:extLst>
+  </p:cSld>
+  <p:clrMapOvr>
+    <a:masterClrMapping/>
+  </p:clrMapOvr>
+</p:sld>
+</file>
+
+<file path=ppt/slides/slide6.xml><?xml version="1.0" encoding="utf-8"?>
+<p:sld xmlns:a="http://schemas.openxmlformats.org/drawingml/2006/main" xmlns:r="http://schemas.openxmlformats.org/officeDocument/2006/relationships" xmlns:p="http://schemas.openxmlformats.org/presentationml/2006/main">
+  <p:cSld>
+    <p:spTree>
+      <p:nvGrpSpPr>
+        <p:cNvPr id="1" name="">
+          <a:extLst>
+            <a:ext uri="{FF2B5EF4-FFF2-40B4-BE49-F238E27FC236}">
+              <a16:creationId xmlns:a16="http://schemas.microsoft.com/office/drawing/2014/main" id="{FD10C43E-FBCC-59EC-91E9-8A85A5F2C163}"/>
+            </a:ext>
+          </a:extLst>
+        </p:cNvPr>
+        <p:cNvGrpSpPr/>
+        <p:nvPr/>
+      </p:nvGrpSpPr>
+      <p:grpSpPr>
+        <a:xfrm>
+          <a:off x="0" y="0"/>
+          <a:ext cx="0" cy="0"/>
+          <a:chOff x="0" y="0"/>
+          <a:chExt cx="0" cy="0"/>
+        </a:xfrm>
+      </p:grpSpPr>
+      <p:sp>
+        <p:nvSpPr>
+          <p:cNvPr id="4" name="Rectangle 3">
+            <a:extLst>
+              <a:ext uri="{FF2B5EF4-FFF2-40B4-BE49-F238E27FC236}">
+                <a16:creationId xmlns:a16="http://schemas.microsoft.com/office/drawing/2014/main" id="{3324AAC3-777A-0BE1-9133-BB8F56216C20}"/>
+              </a:ext>
+            </a:extLst>
+          </p:cNvPr>
+          <p:cNvSpPr/>
+          <p:nvPr/>
+        </p:nvSpPr>
+        <p:spPr>
+          <a:xfrm>
+            <a:off x="5818520" y="3017520"/>
+            <a:ext cx="554959" cy="923330"/>
+          </a:xfrm>
+          <a:prstGeom prst="rect">
+            <a:avLst/>
+          </a:prstGeom>
+          <a:noFill/>
+        </p:spPr>
+        <p:txBody>
+          <a:bodyPr wrap="none" lIns="91440" tIns="45720" rIns="91440" bIns="45720">
+            <a:spAutoFit/>
+          </a:bodyPr>
+          <a:lstStyle/>
+          <a:p>
+            <a:pPr algn="ctr"/>
+            <a:r>
+              <a:rPr lang="en-US" sz="5400" b="0" cap="none" spc="0" dirty="0">
+                <a:ln w="0"/>
+                <a:solidFill>
+                  <a:schemeClr val="tx1"/>
+                </a:solidFill>
+                <a:effectLst>
+                  <a:outerShdw blurRad="38100" dist="19050" dir="2700000" algn="tl" rotWithShape="0">
+                    <a:schemeClr val="dk1">
+                      <a:alpha val="40000"/>
+                    </a:schemeClr>
+                  </a:outerShdw>
+                </a:effectLst>
+              </a:rPr>
+              <a:t>6</a:t>
+            </a:r>
+          </a:p>
+        </p:txBody>
+      </p:sp>
+      <p:pic>
+        <p:nvPicPr>
+          <p:cNvPr id="2" name="Camera 1">
+            <a:extLst>
+              <a:ext uri="{FF2B5EF4-FFF2-40B4-BE49-F238E27FC236}">
+                <a16:creationId xmlns:a16="http://schemas.microsoft.com/office/drawing/2014/main" id="{798DE37A-F02B-E60D-103F-2437B5183CAC}"/>
+              </a:ext>
+            </a:extLst>
+          </p:cNvPr>
+          <p:cNvPicPr>
+            <a:picLocks noChangeAspect="1"/>
+            <a:extLst>
+              <a:ext uri="{51228E76-BA90-4043-B771-695A4F85340A}">
+                <alf:liveFeedProps xmlns:alf="http://schemas.microsoft.com/office/drawing/2021/livefeed"/>
+              </a:ext>
+            </a:extLst>
+          </p:cNvPicPr>
+          <p:nvPr/>
+        </p:nvPicPr>
+        <p:blipFill>
+          <a:blip r:embed="rId3">
+            <a:extLst>
+              <a:ext uri="{96DAC541-7B7A-43D3-8B79-37D633B846F1}">
+                <asvg:svgBlip xmlns:asvg="http://schemas.microsoft.com/office/drawing/2016/SVG/main" r:embed="rId4"/>
+              </a:ext>
+            </a:extLst>
+          </a:blip>
+          <a:stretch>
+            <a:fillRect/>
+          </a:stretch>
+        </p:blipFill>
+        <p:spPr>
+          <a:xfrm>
+            <a:off x="10052304" y="4718304"/>
+            <a:ext cx="2057400" cy="2057400"/>
+          </a:xfrm>
+          <a:prstGeom prst="ellipse">
+            <a:avLst/>
+          </a:prstGeom>
+        </p:spPr>
+      </p:pic>
+    </p:spTree>
+    <p:extLst>
+      <p:ext uri="{BB962C8B-B14F-4D97-AF65-F5344CB8AC3E}">
+        <p14:creationId xmlns:p14="http://schemas.microsoft.com/office/powerpoint/2010/main" val="2443519087"/>
+      </p:ext>
+    </p:extLst>
+  </p:cSld>
+  <p:clrMapOvr>
+    <a:masterClrMapping/>
+  </p:clrMapOvr>
+</p:sld>
+</file>
+
+<file path=ppt/slides/slide7.xml><?xml version="1.0" encoding="utf-8"?>
+<p:sld xmlns:a="http://schemas.openxmlformats.org/drawingml/2006/main" xmlns:r="http://schemas.openxmlformats.org/officeDocument/2006/relationships" xmlns:p="http://schemas.openxmlformats.org/presentationml/2006/main">
+  <p:cSld>
+    <p:spTree>
+      <p:nvGrpSpPr>
+        <p:cNvPr id="1" name="">
+          <a:extLst>
+            <a:ext uri="{FF2B5EF4-FFF2-40B4-BE49-F238E27FC236}">
+              <a16:creationId xmlns:a16="http://schemas.microsoft.com/office/drawing/2014/main" id="{F44894AF-D7F5-9ECF-20E2-FF71C9943852}"/>
+            </a:ext>
+          </a:extLst>
+        </p:cNvPr>
+        <p:cNvGrpSpPr/>
+        <p:nvPr/>
+      </p:nvGrpSpPr>
+      <p:grpSpPr>
+        <a:xfrm>
+          <a:off x="0" y="0"/>
+          <a:ext cx="0" cy="0"/>
+          <a:chOff x="0" y="0"/>
+          <a:chExt cx="0" cy="0"/>
+        </a:xfrm>
+      </p:grpSpPr>
+      <p:sp>
+        <p:nvSpPr>
+          <p:cNvPr id="4" name="Rectangle 3">
+            <a:extLst>
+              <a:ext uri="{FF2B5EF4-FFF2-40B4-BE49-F238E27FC236}">
+                <a16:creationId xmlns:a16="http://schemas.microsoft.com/office/drawing/2014/main" id="{2167215F-1B7F-C10E-99A2-86B4FCEC2557}"/>
+              </a:ext>
+            </a:extLst>
+          </p:cNvPr>
+          <p:cNvSpPr/>
+          <p:nvPr/>
+        </p:nvSpPr>
+        <p:spPr>
+          <a:xfrm>
+            <a:off x="5818520" y="3017520"/>
+            <a:ext cx="554959" cy="923330"/>
+          </a:xfrm>
+          <a:prstGeom prst="rect">
+            <a:avLst/>
+          </a:prstGeom>
+          <a:noFill/>
+        </p:spPr>
+        <p:txBody>
+          <a:bodyPr wrap="none" lIns="91440" tIns="45720" rIns="91440" bIns="45720">
+            <a:spAutoFit/>
+          </a:bodyPr>
+          <a:lstStyle/>
+          <a:p>
+            <a:pPr algn="ctr"/>
+            <a:r>
+              <a:rPr lang="en-US" sz="5400" b="0" cap="none" spc="0" dirty="0">
+                <a:ln w="0"/>
+                <a:solidFill>
+                  <a:schemeClr val="tx1"/>
+                </a:solidFill>
+                <a:effectLst>
+                  <a:outerShdw blurRad="38100" dist="19050" dir="2700000" algn="tl" rotWithShape="0">
+                    <a:schemeClr val="dk1">
+                      <a:alpha val="40000"/>
+                    </a:schemeClr>
+                  </a:outerShdw>
+                </a:effectLst>
+              </a:rPr>
+              <a:t>7</a:t>
+            </a:r>
+          </a:p>
+        </p:txBody>
+      </p:sp>
+      <p:pic>
+        <p:nvPicPr>
+          <p:cNvPr id="2" name="Camera 1">
+            <a:extLst>
+              <a:ext uri="{FF2B5EF4-FFF2-40B4-BE49-F238E27FC236}">
+                <a16:creationId xmlns:a16="http://schemas.microsoft.com/office/drawing/2014/main" id="{CABE05E2-51C0-4B42-451E-4306640C6BE3}"/>
+              </a:ext>
+            </a:extLst>
+          </p:cNvPr>
+          <p:cNvPicPr>
+            <a:picLocks noChangeAspect="1"/>
+            <a:extLst>
+              <a:ext uri="{51228E76-BA90-4043-B771-695A4F85340A}">
+                <alf:liveFeedProps xmlns:alf="http://schemas.microsoft.com/office/drawing/2021/livefeed"/>
+              </a:ext>
+            </a:extLst>
+          </p:cNvPicPr>
+          <p:nvPr/>
+        </p:nvPicPr>
+        <p:blipFill>
+          <a:blip r:embed="rId3">
+            <a:extLst>
+              <a:ext uri="{96DAC541-7B7A-43D3-8B79-37D633B846F1}">
+                <asvg:svgBlip xmlns:asvg="http://schemas.microsoft.com/office/drawing/2016/SVG/main" r:embed="rId4"/>
+              </a:ext>
+            </a:extLst>
+          </a:blip>
+          <a:stretch>
+            <a:fillRect/>
+          </a:stretch>
+        </p:blipFill>
+        <p:spPr>
+          <a:xfrm>
+            <a:off x="10052304" y="4718304"/>
+            <a:ext cx="2057400" cy="2057400"/>
+          </a:xfrm>
+          <a:prstGeom prst="ellipse">
+            <a:avLst/>
+          </a:prstGeom>
+        </p:spPr>
+      </p:pic>
+    </p:spTree>
+    <p:extLst>
+      <p:ext uri="{BB962C8B-B14F-4D97-AF65-F5344CB8AC3E}">
+        <p14:creationId xmlns:p14="http://schemas.microsoft.com/office/powerpoint/2010/main" val="562901522"/>
+      </p:ext>
+    </p:extLst>
+  </p:cSld>
+  <p:clrMapOvr>
+    <a:masterClrMapping/>
+  </p:clrMapOvr>
+</p:sld>
+</file>
+
+<file path=ppt/slides/slide8.xml><?xml version="1.0" encoding="utf-8"?>
+<p:sld xmlns:a="http://schemas.openxmlformats.org/drawingml/2006/main" xmlns:r="http://schemas.openxmlformats.org/officeDocument/2006/relationships" xmlns:p="http://schemas.openxmlformats.org/presentationml/2006/main">
+  <p:cSld>
+    <p:spTree>
+      <p:nvGrpSpPr>
+        <p:cNvPr id="1" name="">
+          <a:extLst>
+            <a:ext uri="{FF2B5EF4-FFF2-40B4-BE49-F238E27FC236}">
+              <a16:creationId xmlns:a16="http://schemas.microsoft.com/office/drawing/2014/main" id="{762510F7-1BB9-5721-8FE0-D8D057DC9482}"/>
+            </a:ext>
+          </a:extLst>
+        </p:cNvPr>
+        <p:cNvGrpSpPr/>
+        <p:nvPr/>
+      </p:nvGrpSpPr>
+      <p:grpSpPr>
+        <a:xfrm>
+          <a:off x="0" y="0"/>
+          <a:ext cx="0" cy="0"/>
+          <a:chOff x="0" y="0"/>
+          <a:chExt cx="0" cy="0"/>
+        </a:xfrm>
+      </p:grpSpPr>
+      <p:sp>
+        <p:nvSpPr>
+          <p:cNvPr id="4" name="Rectangle 3">
+            <a:extLst>
+              <a:ext uri="{FF2B5EF4-FFF2-40B4-BE49-F238E27FC236}">
+                <a16:creationId xmlns:a16="http://schemas.microsoft.com/office/drawing/2014/main" id="{4E6E450F-8A20-1F3A-1FD8-FCFCB29EA5B1}"/>
+              </a:ext>
+            </a:extLst>
+          </p:cNvPr>
+          <p:cNvSpPr/>
+          <p:nvPr/>
+        </p:nvSpPr>
+        <p:spPr>
+          <a:xfrm>
+            <a:off x="5818520" y="3017520"/>
+            <a:ext cx="554959" cy="923330"/>
+          </a:xfrm>
+          <a:prstGeom prst="rect">
+            <a:avLst/>
+          </a:prstGeom>
+          <a:noFill/>
+        </p:spPr>
+        <p:txBody>
+          <a:bodyPr wrap="none" lIns="91440" tIns="45720" rIns="91440" bIns="45720">
+            <a:spAutoFit/>
+          </a:bodyPr>
+          <a:lstStyle/>
+          <a:p>
+            <a:pPr algn="ctr"/>
+            <a:r>
+              <a:rPr lang="en-US" sz="5400" b="0" cap="none" spc="0" dirty="0">
+                <a:ln w="0"/>
+                <a:solidFill>
+                  <a:schemeClr val="tx1"/>
+                </a:solidFill>
+                <a:effectLst>
+                  <a:outerShdw blurRad="38100" dist="19050" dir="2700000" algn="tl" rotWithShape="0">
+                    <a:schemeClr val="dk1">
+                      <a:alpha val="40000"/>
+                    </a:schemeClr>
+                  </a:outerShdw>
+                </a:effectLst>
+              </a:rPr>
+              <a:t>8</a:t>
+            </a:r>
+          </a:p>
+        </p:txBody>
+      </p:sp>
+      <p:pic>
+        <p:nvPicPr>
+          <p:cNvPr id="2" name="Camera 1">
+            <a:extLst>
+              <a:ext uri="{FF2B5EF4-FFF2-40B4-BE49-F238E27FC236}">
+                <a16:creationId xmlns:a16="http://schemas.microsoft.com/office/drawing/2014/main" id="{64DEAB9D-EE09-257F-75D3-980C56AD8541}"/>
+              </a:ext>
+            </a:extLst>
+          </p:cNvPr>
+          <p:cNvPicPr>
+            <a:picLocks noChangeAspect="1"/>
+            <a:extLst>
+              <a:ext uri="{51228E76-BA90-4043-B771-695A4F85340A}">
+                <alf:liveFeedProps xmlns:alf="http://schemas.microsoft.com/office/drawing/2021/livefeed"/>
+              </a:ext>
+            </a:extLst>
+          </p:cNvPicPr>
+          <p:nvPr/>
+        </p:nvPicPr>
+        <p:blipFill>
+          <a:blip r:embed="rId3">
+            <a:extLst>
+              <a:ext uri="{96DAC541-7B7A-43D3-8B79-37D633B846F1}">
+                <asvg:svgBlip xmlns:asvg="http://schemas.microsoft.com/office/drawing/2016/SVG/main" r:embed="rId4"/>
+              </a:ext>
+            </a:extLst>
+          </a:blip>
+          <a:stretch>
+            <a:fillRect/>
+          </a:stretch>
+        </p:blipFill>
+        <p:spPr>
+          <a:xfrm>
+            <a:off x="10052304" y="4718304"/>
+            <a:ext cx="2057400" cy="2057400"/>
+          </a:xfrm>
+          <a:prstGeom prst="ellipse">
+            <a:avLst/>
+          </a:prstGeom>
+        </p:spPr>
+      </p:pic>
+    </p:spTree>
+    <p:extLst>
+      <p:ext uri="{BB962C8B-B14F-4D97-AF65-F5344CB8AC3E}">
+        <p14:creationId xmlns:p14="http://schemas.microsoft.com/office/powerpoint/2010/main" val="3127557150"/>
       </p:ext>
     </p:extLst>
   </p:cSld>

</xml_diff>

<commit_message>
Added functional logic for deleting empty sections
</commit_message>
<xml_diff>
--- a/ForkPowerPointDeck/ForkPowerPointDeck/SampleInputFile.pptx
+++ b/ForkPowerPointDeck/ForkPowerPointDeck/SampleInputFile.pptx
@@ -115,6 +115,32 @@
     </a:lvl9pPr>
   </p:defaultTextStyle>
   <p:extLst>
+    <p:ext uri="{521415D9-36F7-43E2-AB2F-B90AF26B5E84}">
+      <p14:sectionLst xmlns:p14="http://schemas.microsoft.com/office/powerpoint/2010/main">
+        <p14:section name="Empty Section 1" id="{7A52B658-65F4-4608-9909-2CC5B4A08547}">
+          <p14:sldIdLst/>
+        </p14:section>
+        <p14:section name="Section with Slides 1" id="{942061D9-AB1C-4AE0-BE3F-D36EEB7AD5EB}">
+          <p14:sldIdLst>
+            <p14:sldId id="256"/>
+            <p14:sldId id="257"/>
+            <p14:sldId id="258"/>
+            <p14:sldId id="259"/>
+          </p14:sldIdLst>
+        </p14:section>
+        <p14:section name="Section with Slides 2" id="{9376B432-F82B-44DD-B611-DBE3F3DEA883}">
+          <p14:sldIdLst>
+            <p14:sldId id="260"/>
+            <p14:sldId id="261"/>
+            <p14:sldId id="262"/>
+            <p14:sldId id="263"/>
+          </p14:sldIdLst>
+        </p14:section>
+        <p14:section name="Empty Section 2" id="{ADAFE76B-6F07-4EEF-A63C-98F7687BFE30}">
+          <p14:sldIdLst/>
+        </p14:section>
+      </p14:sectionLst>
+    </p:ext>
     <p:ext uri="{EFAFB233-063F-42B5-8137-9DF3F51BA10A}">
       <p15:sldGuideLst xmlns:p15="http://schemas.microsoft.com/office/powerpoint/2012/main"/>
     </p:ext>
@@ -297,7 +323,7 @@
           <a:p>
             <a:fld id="{77CE5ABF-444F-4B13-947F-66DBEF03CC8B}" type="datetimeFigureOut">
               <a:rPr lang="en-CA" smtClean="0"/>
-              <a:t>2024-01-29</a:t>
+              <a:t>2024-02-04</a:t>
             </a:fld>
             <a:endParaRPr lang="en-CA"/>
           </a:p>
@@ -1459,7 +1485,7 @@
           <a:p>
             <a:fld id="{12ED1E1D-55A8-4AE9-857D-DA50F874C535}" type="datetimeFigureOut">
               <a:rPr lang="en-US" smtClean="0"/>
-              <a:t>1/29/2024</a:t>
+              <a:t>2/4/2024</a:t>
             </a:fld>
             <a:endParaRPr lang="en-US"/>
           </a:p>
@@ -1657,7 +1683,7 @@
           <a:p>
             <a:fld id="{12ED1E1D-55A8-4AE9-857D-DA50F874C535}" type="datetimeFigureOut">
               <a:rPr lang="en-US" smtClean="0"/>
-              <a:t>1/29/2024</a:t>
+              <a:t>2/4/2024</a:t>
             </a:fld>
             <a:endParaRPr lang="en-US"/>
           </a:p>
@@ -1865,7 +1891,7 @@
           <a:p>
             <a:fld id="{12ED1E1D-55A8-4AE9-857D-DA50F874C535}" type="datetimeFigureOut">
               <a:rPr lang="en-US" smtClean="0"/>
-              <a:t>1/29/2024</a:t>
+              <a:t>2/4/2024</a:t>
             </a:fld>
             <a:endParaRPr lang="en-US"/>
           </a:p>
@@ -2063,7 +2089,7 @@
           <a:p>
             <a:fld id="{12ED1E1D-55A8-4AE9-857D-DA50F874C535}" type="datetimeFigureOut">
               <a:rPr lang="en-US" smtClean="0"/>
-              <a:t>1/29/2024</a:t>
+              <a:t>2/4/2024</a:t>
             </a:fld>
             <a:endParaRPr lang="en-US"/>
           </a:p>
@@ -2338,7 +2364,7 @@
           <a:p>
             <a:fld id="{12ED1E1D-55A8-4AE9-857D-DA50F874C535}" type="datetimeFigureOut">
               <a:rPr lang="en-US" smtClean="0"/>
-              <a:t>1/29/2024</a:t>
+              <a:t>2/4/2024</a:t>
             </a:fld>
             <a:endParaRPr lang="en-US"/>
           </a:p>
@@ -2603,7 +2629,7 @@
           <a:p>
             <a:fld id="{12ED1E1D-55A8-4AE9-857D-DA50F874C535}" type="datetimeFigureOut">
               <a:rPr lang="en-US" smtClean="0"/>
-              <a:t>1/29/2024</a:t>
+              <a:t>2/4/2024</a:t>
             </a:fld>
             <a:endParaRPr lang="en-US"/>
           </a:p>
@@ -3015,7 +3041,7 @@
           <a:p>
             <a:fld id="{12ED1E1D-55A8-4AE9-857D-DA50F874C535}" type="datetimeFigureOut">
               <a:rPr lang="en-US" smtClean="0"/>
-              <a:t>1/29/2024</a:t>
+              <a:t>2/4/2024</a:t>
             </a:fld>
             <a:endParaRPr lang="en-US"/>
           </a:p>
@@ -3156,7 +3182,7 @@
           <a:p>
             <a:fld id="{12ED1E1D-55A8-4AE9-857D-DA50F874C535}" type="datetimeFigureOut">
               <a:rPr lang="en-US" smtClean="0"/>
-              <a:t>1/29/2024</a:t>
+              <a:t>2/4/2024</a:t>
             </a:fld>
             <a:endParaRPr lang="en-US"/>
           </a:p>
@@ -3269,7 +3295,7 @@
           <a:p>
             <a:fld id="{12ED1E1D-55A8-4AE9-857D-DA50F874C535}" type="datetimeFigureOut">
               <a:rPr lang="en-US" smtClean="0"/>
-              <a:t>1/29/2024</a:t>
+              <a:t>2/4/2024</a:t>
             </a:fld>
             <a:endParaRPr lang="en-US"/>
           </a:p>
@@ -3580,7 +3606,7 @@
           <a:p>
             <a:fld id="{12ED1E1D-55A8-4AE9-857D-DA50F874C535}" type="datetimeFigureOut">
               <a:rPr lang="en-US" smtClean="0"/>
-              <a:t>1/29/2024</a:t>
+              <a:t>2/4/2024</a:t>
             </a:fld>
             <a:endParaRPr lang="en-US"/>
           </a:p>
@@ -3868,7 +3894,7 @@
           <a:p>
             <a:fld id="{12ED1E1D-55A8-4AE9-857D-DA50F874C535}" type="datetimeFigureOut">
               <a:rPr lang="en-US" smtClean="0"/>
-              <a:t>1/29/2024</a:t>
+              <a:t>2/4/2024</a:t>
             </a:fld>
             <a:endParaRPr lang="en-US"/>
           </a:p>
@@ -4109,7 +4135,7 @@
           <a:p>
             <a:fld id="{12ED1E1D-55A8-4AE9-857D-DA50F874C535}" type="datetimeFigureOut">
               <a:rPr lang="en-US" smtClean="0"/>
-              <a:t>1/29/2024</a:t>
+              <a:t>2/4/2024</a:t>
             </a:fld>
             <a:endParaRPr lang="en-US"/>
           </a:p>

</xml_diff>